<commit_message>
modified pptx (belum beres)
</commit_message>
<xml_diff>
--- a/Week 2/26-10-2020/pptx/26-10-2020.pptx
+++ b/Week 2/26-10-2020/pptx/26-10-2020.pptx
@@ -5,11 +5,10 @@
     <p:sldMasterId id="2147483660" r:id="rId4"/>
   </p:sldMasterIdLst>
   <p:notesMasterIdLst>
-    <p:notesMasterId r:id="rId7"/>
+    <p:notesMasterId r:id="rId6"/>
   </p:notesMasterIdLst>
   <p:sldIdLst>
     <p:sldId id="274" r:id="rId5"/>
-    <p:sldId id="307" r:id="rId6"/>
   </p:sldIdLst>
   <p:sldSz cx="12192000" cy="6858000"/>
   <p:notesSz cx="6858000" cy="9144000"/>
@@ -116,2795 +115,6 @@
 </p:presentation>
 </file>
 
-<file path=ppt/diagrams/colors1.xml><?xml version="1.0" encoding="utf-8"?>
-<dgm:colorsDef xmlns:dgm="http://schemas.openxmlformats.org/drawingml/2006/diagram" xmlns:a="http://schemas.openxmlformats.org/drawingml/2006/main" uniqueId="urn:microsoft.com/office/officeart/2018/5/colors/Iconchunking_neutralicon_accent2_2">
-  <dgm:title val=""/>
-  <dgm:desc val=""/>
-  <dgm:catLst>
-    <dgm:cat type="accent2" pri="11200"/>
-  </dgm:catLst>
-  <dgm:styleLbl name="node0">
-    <dgm:fillClrLst meth="repeat">
-      <a:schemeClr val="accent2"/>
-    </dgm:fillClrLst>
-    <dgm:linClrLst meth="repeat">
-      <a:schemeClr val="lt1"/>
-    </dgm:linClrLst>
-    <dgm:effectClrLst/>
-    <dgm:txLinClrLst/>
-    <dgm:txFillClrLst/>
-    <dgm:txEffectClrLst/>
-  </dgm:styleLbl>
-  <dgm:styleLbl name="node1">
-    <dgm:fillClrLst meth="repeat">
-      <a:schemeClr val="bg1"/>
-    </dgm:fillClrLst>
-    <dgm:linClrLst meth="repeat">
-      <a:schemeClr val="lt1">
-        <a:alpha val="0"/>
-      </a:schemeClr>
-    </dgm:linClrLst>
-    <dgm:effectClrLst/>
-    <dgm:txLinClrLst/>
-    <dgm:txFillClrLst meth="repeat">
-      <a:schemeClr val="dk1"/>
-    </dgm:txFillClrLst>
-    <dgm:txEffectClrLst/>
-  </dgm:styleLbl>
-  <dgm:styleLbl name="alignNode1">
-    <dgm:fillClrLst meth="repeat">
-      <a:schemeClr val="accent2"/>
-    </dgm:fillClrLst>
-    <dgm:linClrLst meth="repeat">
-      <a:schemeClr val="accent2"/>
-    </dgm:linClrLst>
-    <dgm:effectClrLst/>
-    <dgm:txLinClrLst/>
-    <dgm:txFillClrLst/>
-    <dgm:txEffectClrLst/>
-  </dgm:styleLbl>
-  <dgm:styleLbl name="lnNode1">
-    <dgm:fillClrLst meth="repeat">
-      <a:schemeClr val="accent2"/>
-    </dgm:fillClrLst>
-    <dgm:linClrLst meth="repeat">
-      <a:schemeClr val="lt1"/>
-    </dgm:linClrLst>
-    <dgm:effectClrLst/>
-    <dgm:txLinClrLst/>
-    <dgm:txFillClrLst/>
-    <dgm:txEffectClrLst/>
-  </dgm:styleLbl>
-  <dgm:styleLbl name="vennNode1">
-    <dgm:fillClrLst meth="repeat">
-      <a:schemeClr val="accent2">
-        <a:alpha val="50000"/>
-      </a:schemeClr>
-    </dgm:fillClrLst>
-    <dgm:linClrLst meth="repeat">
-      <a:schemeClr val="lt1"/>
-    </dgm:linClrLst>
-    <dgm:effectClrLst/>
-    <dgm:txLinClrLst/>
-    <dgm:txFillClrLst/>
-    <dgm:txEffectClrLst/>
-  </dgm:styleLbl>
-  <dgm:styleLbl name="node2">
-    <dgm:fillClrLst meth="repeat">
-      <a:schemeClr val="accent2"/>
-    </dgm:fillClrLst>
-    <dgm:linClrLst meth="repeat">
-      <a:schemeClr val="lt1"/>
-    </dgm:linClrLst>
-    <dgm:effectClrLst/>
-    <dgm:txLinClrLst/>
-    <dgm:txFillClrLst/>
-    <dgm:txEffectClrLst/>
-  </dgm:styleLbl>
-  <dgm:styleLbl name="node3">
-    <dgm:fillClrLst meth="repeat">
-      <a:schemeClr val="accent2"/>
-    </dgm:fillClrLst>
-    <dgm:linClrLst meth="repeat">
-      <a:schemeClr val="lt1"/>
-    </dgm:linClrLst>
-    <dgm:effectClrLst/>
-    <dgm:txLinClrLst/>
-    <dgm:txFillClrLst/>
-    <dgm:txEffectClrLst/>
-  </dgm:styleLbl>
-  <dgm:styleLbl name="node4">
-    <dgm:fillClrLst meth="repeat">
-      <a:schemeClr val="accent2"/>
-    </dgm:fillClrLst>
-    <dgm:linClrLst meth="repeat">
-      <a:schemeClr val="lt1"/>
-    </dgm:linClrLst>
-    <dgm:effectClrLst/>
-    <dgm:txLinClrLst/>
-    <dgm:txFillClrLst/>
-    <dgm:txEffectClrLst/>
-  </dgm:styleLbl>
-  <dgm:styleLbl name="fgImgPlace1">
-    <dgm:fillClrLst meth="repeat">
-      <a:schemeClr val="accent2">
-        <a:tint val="50000"/>
-      </a:schemeClr>
-    </dgm:fillClrLst>
-    <dgm:linClrLst meth="repeat">
-      <a:schemeClr val="lt1"/>
-    </dgm:linClrLst>
-    <dgm:effectClrLst/>
-    <dgm:txLinClrLst/>
-    <dgm:txFillClrLst meth="repeat">
-      <a:schemeClr val="lt1"/>
-    </dgm:txFillClrLst>
-    <dgm:txEffectClrLst/>
-  </dgm:styleLbl>
-  <dgm:styleLbl name="alignImgPlace1">
-    <dgm:fillClrLst meth="repeat">
-      <a:schemeClr val="accent2">
-        <a:tint val="50000"/>
-      </a:schemeClr>
-    </dgm:fillClrLst>
-    <dgm:linClrLst meth="repeat">
-      <a:schemeClr val="lt1"/>
-    </dgm:linClrLst>
-    <dgm:effectClrLst/>
-    <dgm:txLinClrLst/>
-    <dgm:txFillClrLst meth="repeat">
-      <a:schemeClr val="lt1"/>
-    </dgm:txFillClrLst>
-    <dgm:txEffectClrLst/>
-  </dgm:styleLbl>
-  <dgm:styleLbl name="bgImgPlace1">
-    <dgm:fillClrLst meth="repeat">
-      <a:schemeClr val="accent2">
-        <a:tint val="50000"/>
-      </a:schemeClr>
-    </dgm:fillClrLst>
-    <dgm:linClrLst meth="repeat">
-      <a:schemeClr val="lt1"/>
-    </dgm:linClrLst>
-    <dgm:effectClrLst/>
-    <dgm:txLinClrLst/>
-    <dgm:txFillClrLst meth="repeat">
-      <a:schemeClr val="lt1"/>
-    </dgm:txFillClrLst>
-    <dgm:txEffectClrLst/>
-  </dgm:styleLbl>
-  <dgm:styleLbl name="sibTrans2D1">
-    <dgm:fillClrLst meth="repeat">
-      <a:schemeClr val="accent2">
-        <a:tint val="60000"/>
-      </a:schemeClr>
-    </dgm:fillClrLst>
-    <dgm:linClrLst meth="repeat">
-      <a:schemeClr val="accent2">
-        <a:tint val="60000"/>
-      </a:schemeClr>
-    </dgm:linClrLst>
-    <dgm:effectClrLst/>
-    <dgm:txLinClrLst/>
-    <dgm:txFillClrLst/>
-    <dgm:txEffectClrLst/>
-  </dgm:styleLbl>
-  <dgm:styleLbl name="fgSibTrans2D1">
-    <dgm:fillClrLst meth="repeat">
-      <a:schemeClr val="accent2">
-        <a:tint val="60000"/>
-      </a:schemeClr>
-    </dgm:fillClrLst>
-    <dgm:linClrLst meth="repeat">
-      <a:schemeClr val="accent2">
-        <a:tint val="60000"/>
-      </a:schemeClr>
-    </dgm:linClrLst>
-    <dgm:effectClrLst/>
-    <dgm:txLinClrLst/>
-    <dgm:txFillClrLst/>
-    <dgm:txEffectClrLst/>
-  </dgm:styleLbl>
-  <dgm:styleLbl name="bgSibTrans2D1">
-    <dgm:fillClrLst meth="repeat">
-      <a:schemeClr val="accent2">
-        <a:tint val="60000"/>
-      </a:schemeClr>
-    </dgm:fillClrLst>
-    <dgm:linClrLst meth="repeat">
-      <a:schemeClr val="accent2">
-        <a:tint val="60000"/>
-      </a:schemeClr>
-    </dgm:linClrLst>
-    <dgm:effectClrLst/>
-    <dgm:txLinClrLst/>
-    <dgm:txFillClrLst/>
-    <dgm:txEffectClrLst/>
-  </dgm:styleLbl>
-  <dgm:styleLbl name="sibTrans1D1">
-    <dgm:fillClrLst meth="repeat">
-      <a:schemeClr val="accent2"/>
-    </dgm:fillClrLst>
-    <dgm:linClrLst meth="repeat">
-      <a:schemeClr val="accent2"/>
-    </dgm:linClrLst>
-    <dgm:effectClrLst/>
-    <dgm:txLinClrLst/>
-    <dgm:txFillClrLst meth="repeat">
-      <a:schemeClr val="tx1"/>
-    </dgm:txFillClrLst>
-    <dgm:txEffectClrLst/>
-  </dgm:styleLbl>
-  <dgm:styleLbl name="callout">
-    <dgm:fillClrLst meth="repeat">
-      <a:schemeClr val="accent2"/>
-    </dgm:fillClrLst>
-    <dgm:linClrLst meth="repeat">
-      <a:schemeClr val="accent2">
-        <a:tint val="50000"/>
-      </a:schemeClr>
-    </dgm:linClrLst>
-    <dgm:effectClrLst/>
-    <dgm:txLinClrLst/>
-    <dgm:txFillClrLst meth="repeat">
-      <a:schemeClr val="tx1"/>
-    </dgm:txFillClrLst>
-    <dgm:txEffectClrLst/>
-  </dgm:styleLbl>
-  <dgm:styleLbl name="asst0">
-    <dgm:fillClrLst meth="repeat">
-      <a:schemeClr val="accent2"/>
-    </dgm:fillClrLst>
-    <dgm:linClrLst meth="repeat">
-      <a:schemeClr val="lt1"/>
-    </dgm:linClrLst>
-    <dgm:effectClrLst/>
-    <dgm:txLinClrLst/>
-    <dgm:txFillClrLst/>
-    <dgm:txEffectClrLst/>
-  </dgm:styleLbl>
-  <dgm:styleLbl name="asst1">
-    <dgm:fillClrLst meth="repeat">
-      <a:schemeClr val="accent2"/>
-    </dgm:fillClrLst>
-    <dgm:linClrLst meth="repeat">
-      <a:schemeClr val="lt1"/>
-    </dgm:linClrLst>
-    <dgm:effectClrLst/>
-    <dgm:txLinClrLst/>
-    <dgm:txFillClrLst/>
-    <dgm:txEffectClrLst/>
-  </dgm:styleLbl>
-  <dgm:styleLbl name="asst2">
-    <dgm:fillClrLst meth="repeat">
-      <a:schemeClr val="accent2"/>
-    </dgm:fillClrLst>
-    <dgm:linClrLst meth="repeat">
-      <a:schemeClr val="lt1"/>
-    </dgm:linClrLst>
-    <dgm:effectClrLst/>
-    <dgm:txLinClrLst/>
-    <dgm:txFillClrLst/>
-    <dgm:txEffectClrLst/>
-  </dgm:styleLbl>
-  <dgm:styleLbl name="asst3">
-    <dgm:fillClrLst meth="repeat">
-      <a:schemeClr val="accent2"/>
-    </dgm:fillClrLst>
-    <dgm:linClrLst meth="repeat">
-      <a:schemeClr val="lt1"/>
-    </dgm:linClrLst>
-    <dgm:effectClrLst/>
-    <dgm:txLinClrLst/>
-    <dgm:txFillClrLst/>
-    <dgm:txEffectClrLst/>
-  </dgm:styleLbl>
-  <dgm:styleLbl name="asst4">
-    <dgm:fillClrLst meth="repeat">
-      <a:schemeClr val="accent2"/>
-    </dgm:fillClrLst>
-    <dgm:linClrLst meth="repeat">
-      <a:schemeClr val="lt1"/>
-    </dgm:linClrLst>
-    <dgm:effectClrLst/>
-    <dgm:txLinClrLst/>
-    <dgm:txFillClrLst/>
-    <dgm:txEffectClrLst/>
-  </dgm:styleLbl>
-  <dgm:styleLbl name="parChTrans2D1">
-    <dgm:fillClrLst meth="repeat">
-      <a:schemeClr val="accent2">
-        <a:tint val="60000"/>
-      </a:schemeClr>
-    </dgm:fillClrLst>
-    <dgm:linClrLst meth="repeat">
-      <a:schemeClr val="accent2">
-        <a:tint val="60000"/>
-      </a:schemeClr>
-    </dgm:linClrLst>
-    <dgm:effectClrLst/>
-    <dgm:txLinClrLst/>
-    <dgm:txFillClrLst meth="repeat">
-      <a:schemeClr val="lt1"/>
-    </dgm:txFillClrLst>
-    <dgm:txEffectClrLst/>
-  </dgm:styleLbl>
-  <dgm:styleLbl name="parChTrans2D2">
-    <dgm:fillClrLst meth="repeat">
-      <a:schemeClr val="accent2"/>
-    </dgm:fillClrLst>
-    <dgm:linClrLst meth="repeat">
-      <a:schemeClr val="accent2"/>
-    </dgm:linClrLst>
-    <dgm:effectClrLst/>
-    <dgm:txLinClrLst/>
-    <dgm:txFillClrLst meth="repeat">
-      <a:schemeClr val="lt1"/>
-    </dgm:txFillClrLst>
-    <dgm:txEffectClrLst/>
-  </dgm:styleLbl>
-  <dgm:styleLbl name="parChTrans2D3">
-    <dgm:fillClrLst meth="repeat">
-      <a:schemeClr val="accent2"/>
-    </dgm:fillClrLst>
-    <dgm:linClrLst meth="repeat">
-      <a:schemeClr val="accent2"/>
-    </dgm:linClrLst>
-    <dgm:effectClrLst/>
-    <dgm:txLinClrLst/>
-    <dgm:txFillClrLst meth="repeat">
-      <a:schemeClr val="lt1"/>
-    </dgm:txFillClrLst>
-    <dgm:txEffectClrLst/>
-  </dgm:styleLbl>
-  <dgm:styleLbl name="parChTrans2D4">
-    <dgm:fillClrLst meth="repeat">
-      <a:schemeClr val="accent2"/>
-    </dgm:fillClrLst>
-    <dgm:linClrLst meth="repeat">
-      <a:schemeClr val="accent2"/>
-    </dgm:linClrLst>
-    <dgm:effectClrLst/>
-    <dgm:txLinClrLst/>
-    <dgm:txFillClrLst meth="repeat">
-      <a:schemeClr val="lt1"/>
-    </dgm:txFillClrLst>
-    <dgm:txEffectClrLst/>
-  </dgm:styleLbl>
-  <dgm:styleLbl name="parChTrans1D1">
-    <dgm:fillClrLst meth="repeat">
-      <a:schemeClr val="accent2"/>
-    </dgm:fillClrLst>
-    <dgm:linClrLst meth="repeat">
-      <a:schemeClr val="accent2">
-        <a:shade val="60000"/>
-      </a:schemeClr>
-    </dgm:linClrLst>
-    <dgm:effectClrLst/>
-    <dgm:txLinClrLst/>
-    <dgm:txFillClrLst meth="repeat">
-      <a:schemeClr val="tx1"/>
-    </dgm:txFillClrLst>
-    <dgm:txEffectClrLst/>
-  </dgm:styleLbl>
-  <dgm:styleLbl name="parChTrans1D2">
-    <dgm:fillClrLst meth="repeat">
-      <a:schemeClr val="accent2"/>
-    </dgm:fillClrLst>
-    <dgm:linClrLst meth="repeat">
-      <a:schemeClr val="accent2">
-        <a:shade val="60000"/>
-      </a:schemeClr>
-    </dgm:linClrLst>
-    <dgm:effectClrLst/>
-    <dgm:txLinClrLst/>
-    <dgm:txFillClrLst meth="repeat">
-      <a:schemeClr val="tx1"/>
-    </dgm:txFillClrLst>
-    <dgm:txEffectClrLst/>
-  </dgm:styleLbl>
-  <dgm:styleLbl name="parChTrans1D3">
-    <dgm:fillClrLst meth="repeat">
-      <a:schemeClr val="accent2"/>
-    </dgm:fillClrLst>
-    <dgm:linClrLst meth="repeat">
-      <a:schemeClr val="accent2">
-        <a:shade val="80000"/>
-      </a:schemeClr>
-    </dgm:linClrLst>
-    <dgm:effectClrLst/>
-    <dgm:txLinClrLst/>
-    <dgm:txFillClrLst meth="repeat">
-      <a:schemeClr val="tx1"/>
-    </dgm:txFillClrLst>
-    <dgm:txEffectClrLst/>
-  </dgm:styleLbl>
-  <dgm:styleLbl name="parChTrans1D4">
-    <dgm:fillClrLst meth="repeat">
-      <a:schemeClr val="accent2"/>
-    </dgm:fillClrLst>
-    <dgm:linClrLst meth="repeat">
-      <a:schemeClr val="accent2">
-        <a:shade val="80000"/>
-      </a:schemeClr>
-    </dgm:linClrLst>
-    <dgm:effectClrLst/>
-    <dgm:txLinClrLst/>
-    <dgm:txFillClrLst meth="repeat">
-      <a:schemeClr val="tx1"/>
-    </dgm:txFillClrLst>
-    <dgm:txEffectClrLst/>
-  </dgm:styleLbl>
-  <dgm:styleLbl name="fgAcc1">
-    <dgm:fillClrLst meth="repeat">
-      <a:schemeClr val="lt1">
-        <a:alpha val="90000"/>
-      </a:schemeClr>
-    </dgm:fillClrLst>
-    <dgm:linClrLst meth="repeat">
-      <a:schemeClr val="accent2"/>
-    </dgm:linClrLst>
-    <dgm:effectClrLst/>
-    <dgm:txLinClrLst/>
-    <dgm:txFillClrLst meth="repeat">
-      <a:schemeClr val="dk1"/>
-    </dgm:txFillClrLst>
-    <dgm:txEffectClrLst/>
-  </dgm:styleLbl>
-  <dgm:styleLbl name="conFgAcc1">
-    <dgm:fillClrLst meth="repeat">
-      <a:schemeClr val="lt1">
-        <a:alpha val="90000"/>
-      </a:schemeClr>
-    </dgm:fillClrLst>
-    <dgm:linClrLst meth="repeat">
-      <a:schemeClr val="accent2"/>
-    </dgm:linClrLst>
-    <dgm:effectClrLst/>
-    <dgm:txLinClrLst/>
-    <dgm:txFillClrLst meth="repeat">
-      <a:schemeClr val="dk1"/>
-    </dgm:txFillClrLst>
-    <dgm:txEffectClrLst/>
-  </dgm:styleLbl>
-  <dgm:styleLbl name="alignAcc1">
-    <dgm:fillClrLst meth="repeat">
-      <a:schemeClr val="lt1">
-        <a:alpha val="90000"/>
-      </a:schemeClr>
-    </dgm:fillClrLst>
-    <dgm:linClrLst meth="repeat">
-      <a:schemeClr val="accent2"/>
-    </dgm:linClrLst>
-    <dgm:effectClrLst/>
-    <dgm:txLinClrLst/>
-    <dgm:txFillClrLst meth="repeat">
-      <a:schemeClr val="dk1"/>
-    </dgm:txFillClrLst>
-    <dgm:txEffectClrLst/>
-  </dgm:styleLbl>
-  <dgm:styleLbl name="trAlignAcc1">
-    <dgm:fillClrLst meth="repeat">
-      <a:schemeClr val="lt1">
-        <a:alpha val="40000"/>
-      </a:schemeClr>
-    </dgm:fillClrLst>
-    <dgm:linClrLst meth="repeat">
-      <a:schemeClr val="accent2"/>
-    </dgm:linClrLst>
-    <dgm:effectClrLst/>
-    <dgm:txLinClrLst/>
-    <dgm:txFillClrLst meth="repeat">
-      <a:schemeClr val="dk1"/>
-    </dgm:txFillClrLst>
-    <dgm:txEffectClrLst/>
-  </dgm:styleLbl>
-  <dgm:styleLbl name="bgAcc1">
-    <dgm:fillClrLst meth="repeat">
-      <a:schemeClr val="lt1">
-        <a:alpha val="90000"/>
-      </a:schemeClr>
-    </dgm:fillClrLst>
-    <dgm:linClrLst meth="repeat">
-      <a:schemeClr val="accent2"/>
-    </dgm:linClrLst>
-    <dgm:effectClrLst/>
-    <dgm:txLinClrLst/>
-    <dgm:txFillClrLst meth="repeat">
-      <a:schemeClr val="dk1"/>
-    </dgm:txFillClrLst>
-    <dgm:txEffectClrLst/>
-  </dgm:styleLbl>
-  <dgm:styleLbl name="solidFgAcc1">
-    <dgm:fillClrLst meth="repeat">
-      <a:schemeClr val="lt1"/>
-    </dgm:fillClrLst>
-    <dgm:linClrLst meth="repeat">
-      <a:schemeClr val="accent2"/>
-    </dgm:linClrLst>
-    <dgm:effectClrLst/>
-    <dgm:txLinClrLst/>
-    <dgm:txFillClrLst meth="repeat">
-      <a:schemeClr val="dk1"/>
-    </dgm:txFillClrLst>
-    <dgm:txEffectClrLst/>
-  </dgm:styleLbl>
-  <dgm:styleLbl name="solidAlignAcc1">
-    <dgm:fillClrLst meth="repeat">
-      <a:schemeClr val="lt1"/>
-    </dgm:fillClrLst>
-    <dgm:linClrLst meth="repeat">
-      <a:schemeClr val="accent2"/>
-    </dgm:linClrLst>
-    <dgm:effectClrLst/>
-    <dgm:txLinClrLst/>
-    <dgm:txFillClrLst meth="repeat">
-      <a:schemeClr val="dk1"/>
-    </dgm:txFillClrLst>
-    <dgm:txEffectClrLst/>
-  </dgm:styleLbl>
-  <dgm:styleLbl name="solidBgAcc1">
-    <dgm:fillClrLst meth="repeat">
-      <a:schemeClr val="lt1"/>
-    </dgm:fillClrLst>
-    <dgm:linClrLst meth="repeat">
-      <a:schemeClr val="accent2"/>
-    </dgm:linClrLst>
-    <dgm:effectClrLst/>
-    <dgm:txLinClrLst/>
-    <dgm:txFillClrLst meth="repeat">
-      <a:schemeClr val="dk1"/>
-    </dgm:txFillClrLst>
-    <dgm:txEffectClrLst/>
-  </dgm:styleLbl>
-  <dgm:styleLbl name="fgAccFollowNode1">
-    <dgm:fillClrLst meth="repeat">
-      <a:schemeClr val="accent2">
-        <a:alpha val="90000"/>
-        <a:tint val="40000"/>
-      </a:schemeClr>
-    </dgm:fillClrLst>
-    <dgm:linClrLst meth="repeat">
-      <a:schemeClr val="accent2">
-        <a:alpha val="90000"/>
-        <a:tint val="40000"/>
-      </a:schemeClr>
-    </dgm:linClrLst>
-    <dgm:effectClrLst/>
-    <dgm:txLinClrLst/>
-    <dgm:txFillClrLst meth="repeat">
-      <a:schemeClr val="dk1"/>
-    </dgm:txFillClrLst>
-    <dgm:txEffectClrLst/>
-  </dgm:styleLbl>
-  <dgm:styleLbl name="alignAccFollowNode1">
-    <dgm:fillClrLst meth="repeat">
-      <a:schemeClr val="accent2">
-        <a:alpha val="90000"/>
-        <a:tint val="40000"/>
-      </a:schemeClr>
-    </dgm:fillClrLst>
-    <dgm:linClrLst meth="repeat">
-      <a:schemeClr val="accent2">
-        <a:alpha val="90000"/>
-        <a:tint val="40000"/>
-      </a:schemeClr>
-    </dgm:linClrLst>
-    <dgm:effectClrLst/>
-    <dgm:txLinClrLst/>
-    <dgm:txFillClrLst meth="repeat">
-      <a:schemeClr val="dk1"/>
-    </dgm:txFillClrLst>
-    <dgm:txEffectClrLst/>
-  </dgm:styleLbl>
-  <dgm:styleLbl name="bgAccFollowNode1">
-    <dgm:fillClrLst meth="repeat">
-      <a:schemeClr val="accent2">
-        <a:alpha val="90000"/>
-        <a:tint val="40000"/>
-      </a:schemeClr>
-    </dgm:fillClrLst>
-    <dgm:linClrLst meth="repeat">
-      <a:schemeClr val="accent2">
-        <a:alpha val="90000"/>
-        <a:tint val="40000"/>
-      </a:schemeClr>
-    </dgm:linClrLst>
-    <dgm:effectClrLst/>
-    <dgm:txLinClrLst/>
-    <dgm:txFillClrLst meth="repeat">
-      <a:schemeClr val="dk1"/>
-    </dgm:txFillClrLst>
-    <dgm:txEffectClrLst/>
-  </dgm:styleLbl>
-  <dgm:styleLbl name="fgAcc0">
-    <dgm:fillClrLst meth="repeat">
-      <a:schemeClr val="lt1">
-        <a:alpha val="90000"/>
-      </a:schemeClr>
-    </dgm:fillClrLst>
-    <dgm:linClrLst meth="repeat">
-      <a:schemeClr val="accent2"/>
-    </dgm:linClrLst>
-    <dgm:effectClrLst/>
-    <dgm:txLinClrLst/>
-    <dgm:txFillClrLst meth="repeat">
-      <a:schemeClr val="dk1"/>
-    </dgm:txFillClrLst>
-    <dgm:txEffectClrLst/>
-  </dgm:styleLbl>
-  <dgm:styleLbl name="fgAcc2">
-    <dgm:fillClrLst meth="repeat">
-      <a:schemeClr val="lt1">
-        <a:alpha val="90000"/>
-      </a:schemeClr>
-    </dgm:fillClrLst>
-    <dgm:linClrLst meth="repeat">
-      <a:schemeClr val="accent2"/>
-    </dgm:linClrLst>
-    <dgm:effectClrLst/>
-    <dgm:txLinClrLst/>
-    <dgm:txFillClrLst meth="repeat">
-      <a:schemeClr val="dk1"/>
-    </dgm:txFillClrLst>
-    <dgm:txEffectClrLst/>
-  </dgm:styleLbl>
-  <dgm:styleLbl name="fgAcc3">
-    <dgm:fillClrLst meth="repeat">
-      <a:schemeClr val="lt1">
-        <a:alpha val="90000"/>
-      </a:schemeClr>
-    </dgm:fillClrLst>
-    <dgm:linClrLst meth="repeat">
-      <a:schemeClr val="accent2"/>
-    </dgm:linClrLst>
-    <dgm:effectClrLst/>
-    <dgm:txLinClrLst/>
-    <dgm:txFillClrLst meth="repeat">
-      <a:schemeClr val="dk1"/>
-    </dgm:txFillClrLst>
-    <dgm:txEffectClrLst/>
-  </dgm:styleLbl>
-  <dgm:styleLbl name="fgAcc4">
-    <dgm:fillClrLst meth="repeat">
-      <a:schemeClr val="lt1">
-        <a:alpha val="90000"/>
-      </a:schemeClr>
-    </dgm:fillClrLst>
-    <dgm:linClrLst meth="repeat">
-      <a:schemeClr val="accent2"/>
-    </dgm:linClrLst>
-    <dgm:effectClrLst/>
-    <dgm:txLinClrLst/>
-    <dgm:txFillClrLst meth="repeat">
-      <a:schemeClr val="dk1"/>
-    </dgm:txFillClrLst>
-    <dgm:txEffectClrLst/>
-  </dgm:styleLbl>
-  <dgm:styleLbl name="bgShp">
-    <dgm:fillClrLst meth="repeat">
-      <a:schemeClr val="accent2"/>
-    </dgm:fillClrLst>
-    <dgm:linClrLst meth="repeat">
-      <a:schemeClr val="lt1">
-        <a:alpha val="0"/>
-      </a:schemeClr>
-    </dgm:linClrLst>
-    <dgm:effectClrLst/>
-    <dgm:txLinClrLst/>
-    <dgm:txFillClrLst/>
-    <dgm:txEffectClrLst/>
-  </dgm:styleLbl>
-  <dgm:styleLbl name="dkBgShp">
-    <dgm:fillClrLst meth="repeat">
-      <a:schemeClr val="accent2">
-        <a:shade val="80000"/>
-      </a:schemeClr>
-    </dgm:fillClrLst>
-    <dgm:linClrLst meth="repeat">
-      <a:schemeClr val="accent2"/>
-    </dgm:linClrLst>
-    <dgm:effectClrLst/>
-    <dgm:txLinClrLst/>
-    <dgm:txFillClrLst meth="repeat">
-      <a:schemeClr val="lt1"/>
-    </dgm:txFillClrLst>
-    <dgm:txEffectClrLst/>
-  </dgm:styleLbl>
-  <dgm:styleLbl name="trBgShp">
-    <dgm:fillClrLst meth="repeat">
-      <a:schemeClr val="accent2">
-        <a:tint val="50000"/>
-        <a:alpha val="40000"/>
-      </a:schemeClr>
-    </dgm:fillClrLst>
-    <dgm:linClrLst meth="repeat">
-      <a:schemeClr val="accent2"/>
-    </dgm:linClrLst>
-    <dgm:effectClrLst/>
-    <dgm:txLinClrLst/>
-    <dgm:txFillClrLst meth="repeat">
-      <a:schemeClr val="lt1"/>
-    </dgm:txFillClrLst>
-    <dgm:txEffectClrLst/>
-  </dgm:styleLbl>
-  <dgm:styleLbl name="fgShp">
-    <dgm:fillClrLst meth="repeat">
-      <a:schemeClr val="accent2">
-        <a:tint val="60000"/>
-      </a:schemeClr>
-    </dgm:fillClrLst>
-    <dgm:linClrLst meth="repeat">
-      <a:schemeClr val="lt1"/>
-    </dgm:linClrLst>
-    <dgm:effectClrLst/>
-    <dgm:txLinClrLst/>
-    <dgm:txFillClrLst meth="repeat">
-      <a:schemeClr val="dk1"/>
-    </dgm:txFillClrLst>
-    <dgm:txEffectClrLst/>
-  </dgm:styleLbl>
-  <dgm:styleLbl name="revTx">
-    <dgm:fillClrLst meth="repeat">
-      <a:schemeClr val="lt1">
-        <a:alpha val="0"/>
-      </a:schemeClr>
-    </dgm:fillClrLst>
-    <dgm:linClrLst meth="repeat">
-      <a:schemeClr val="dk1">
-        <a:alpha val="0"/>
-      </a:schemeClr>
-    </dgm:linClrLst>
-    <dgm:effectClrLst/>
-    <dgm:txLinClrLst/>
-    <dgm:txFillClrLst meth="repeat">
-      <a:schemeClr val="tx1"/>
-    </dgm:txFillClrLst>
-    <dgm:txEffectClrLst/>
-  </dgm:styleLbl>
-</dgm:colorsDef>
-</file>
-
-<file path=ppt/diagrams/data1.xml><?xml version="1.0" encoding="utf-8"?>
-<dgm:dataModel xmlns:dgm="http://schemas.openxmlformats.org/drawingml/2006/diagram" xmlns:a="http://schemas.openxmlformats.org/drawingml/2006/main">
-  <dgm:ptLst>
-    <dgm:pt modelId="{01A66772-F185-4D58-B8BB-E9370D7A7A2B}" type="doc">
-      <dgm:prSet loTypeId="urn:microsoft.com/office/officeart/2018/5/layout/IconCircleLabelList" loCatId="icon" qsTypeId="urn:microsoft.com/office/officeart/2005/8/quickstyle/simple1" qsCatId="simple" csTypeId="urn:microsoft.com/office/officeart/2018/5/colors/Iconchunking_neutralicon_accent2_2" csCatId="accent2" phldr="1"/>
-      <dgm:spPr/>
-      <dgm:t>
-        <a:bodyPr/>
-        <a:lstStyle/>
-        <a:p>
-          <a:endParaRPr lang="en-US"/>
-        </a:p>
-      </dgm:t>
-    </dgm:pt>
-    <dgm:pt modelId="{40FC4FFE-8987-4A26-B7F4-8A516F18ADAE}">
-      <dgm:prSet/>
-      <dgm:spPr/>
-      <dgm:t>
-        <a:bodyPr/>
-        <a:lstStyle/>
-        <a:p>
-          <a:pPr>
-            <a:lnSpc>
-              <a:spcPct val="100000"/>
-            </a:lnSpc>
-            <a:defRPr cap="all"/>
-          </a:pPr>
-          <a:r>
-            <a:rPr lang="en-US" dirty="0"/>
-            <a:t>Lorem ipsum dolor sit amet, consectetuer adipiscing elit. </a:t>
-          </a:r>
-        </a:p>
-      </dgm:t>
-    </dgm:pt>
-    <dgm:pt modelId="{CAD7EF86-FB23-41F6-BF42-040B36DEFDB1}" type="parTrans" cxnId="{C7AD8469-3C68-4AF9-AB82-79B0043AA120}">
-      <dgm:prSet/>
-      <dgm:spPr/>
-      <dgm:t>
-        <a:bodyPr/>
-        <a:lstStyle/>
-        <a:p>
-          <a:endParaRPr lang="en-US"/>
-        </a:p>
-      </dgm:t>
-    </dgm:pt>
-    <dgm:pt modelId="{5B62599A-5C9B-48E7-896E-EA782AC60C8B}" type="sibTrans" cxnId="{C7AD8469-3C68-4AF9-AB82-79B0043AA120}">
-      <dgm:prSet/>
-      <dgm:spPr/>
-      <dgm:t>
-        <a:bodyPr/>
-        <a:lstStyle/>
-        <a:p>
-          <a:endParaRPr lang="en-US"/>
-        </a:p>
-      </dgm:t>
-    </dgm:pt>
-    <dgm:pt modelId="{49225C73-1633-42F1-AB3B-7CB183E5F8B8}">
-      <dgm:prSet/>
-      <dgm:spPr/>
-      <dgm:t>
-        <a:bodyPr/>
-        <a:lstStyle/>
-        <a:p>
-          <a:pPr>
-            <a:lnSpc>
-              <a:spcPct val="100000"/>
-            </a:lnSpc>
-            <a:defRPr cap="all"/>
-          </a:pPr>
-          <a:r>
-            <a:rPr lang="en-US" dirty="0"/>
-            <a:t>Nunc viverra imperdiet enim. Fusce est. Vivamus a tellus.</a:t>
-          </a:r>
-        </a:p>
-      </dgm:t>
-    </dgm:pt>
-    <dgm:pt modelId="{1A0E2090-1D4F-438A-8766-B6030CE01ADD}" type="parTrans" cxnId="{A9154303-8225-4248-91DC-1B0156A35F07}">
-      <dgm:prSet/>
-      <dgm:spPr/>
-      <dgm:t>
-        <a:bodyPr/>
-        <a:lstStyle/>
-        <a:p>
-          <a:endParaRPr lang="en-US"/>
-        </a:p>
-      </dgm:t>
-    </dgm:pt>
-    <dgm:pt modelId="{9646853A-8964-4519-A5B1-0B7D18B2983D}" type="sibTrans" cxnId="{A9154303-8225-4248-91DC-1B0156A35F07}">
-      <dgm:prSet/>
-      <dgm:spPr/>
-      <dgm:t>
-        <a:bodyPr/>
-        <a:lstStyle/>
-        <a:p>
-          <a:endParaRPr lang="en-US"/>
-        </a:p>
-      </dgm:t>
-    </dgm:pt>
-    <dgm:pt modelId="{1C383F32-22E8-4F62-A3E0-BDC3D5F48992}">
-      <dgm:prSet/>
-      <dgm:spPr/>
-      <dgm:t>
-        <a:bodyPr/>
-        <a:lstStyle/>
-        <a:p>
-          <a:pPr>
-            <a:lnSpc>
-              <a:spcPct val="100000"/>
-            </a:lnSpc>
-            <a:defRPr cap="all"/>
-          </a:pPr>
-          <a:r>
-            <a:rPr lang="en-US" dirty="0"/>
-            <a:t>Pellentesque habitant morbi tristique senectus et netus.</a:t>
-          </a:r>
-        </a:p>
-      </dgm:t>
-    </dgm:pt>
-    <dgm:pt modelId="{A7920A2F-3244-4159-AF04-6A1D38B7B317}" type="parTrans" cxnId="{C4CCE57E-E871-46D6-BAD5-880252C95D22}">
-      <dgm:prSet/>
-      <dgm:spPr/>
-      <dgm:t>
-        <a:bodyPr/>
-        <a:lstStyle/>
-        <a:p>
-          <a:endParaRPr lang="en-US"/>
-        </a:p>
-      </dgm:t>
-    </dgm:pt>
-    <dgm:pt modelId="{8500F72A-2C6D-4FDF-9C1D-CA691380EB0B}" type="sibTrans" cxnId="{C4CCE57E-E871-46D6-BAD5-880252C95D22}">
-      <dgm:prSet/>
-      <dgm:spPr/>
-      <dgm:t>
-        <a:bodyPr/>
-        <a:lstStyle/>
-        <a:p>
-          <a:endParaRPr lang="en-US"/>
-        </a:p>
-      </dgm:t>
-    </dgm:pt>
-    <dgm:pt modelId="{50B3CE7C-E10B-4E23-BD93-03664997C932}" type="pres">
-      <dgm:prSet presAssocID="{01A66772-F185-4D58-B8BB-E9370D7A7A2B}" presName="root" presStyleCnt="0">
-        <dgm:presLayoutVars>
-          <dgm:dir/>
-          <dgm:resizeHandles val="exact"/>
-        </dgm:presLayoutVars>
-      </dgm:prSet>
-      <dgm:spPr/>
-    </dgm:pt>
-    <dgm:pt modelId="{DE9CE479-E4AE-4283-AEF1-10C1535B4324}" type="pres">
-      <dgm:prSet presAssocID="{40FC4FFE-8987-4A26-B7F4-8A516F18ADAE}" presName="compNode" presStyleCnt="0"/>
-      <dgm:spPr/>
-    </dgm:pt>
-    <dgm:pt modelId="{B59FCF02-CAD2-4D6F-9542-AD86711168CA}" type="pres">
-      <dgm:prSet presAssocID="{40FC4FFE-8987-4A26-B7F4-8A516F18ADAE}" presName="iconBgRect" presStyleLbl="bgShp" presStyleIdx="0" presStyleCnt="3"/>
-      <dgm:spPr>
-        <a:solidFill>
-          <a:schemeClr val="accent1"/>
-        </a:solidFill>
-      </dgm:spPr>
-    </dgm:pt>
-    <dgm:pt modelId="{7C175B98-93F4-4D7C-BB95-1514AB879CD5}" type="pres">
-      <dgm:prSet presAssocID="{40FC4FFE-8987-4A26-B7F4-8A516F18ADAE}" presName="iconRect" presStyleLbl="node1" presStyleIdx="0" presStyleCnt="3"/>
-      <dgm:spPr>
-        <a:blipFill>
-          <a:blip xmlns:r="http://schemas.openxmlformats.org/officeDocument/2006/relationships" r:embed="rId1">
-            <a:extLst>
-              <a:ext uri="{96DAC541-7B7A-43D3-8B79-37D633B846F1}">
-                <asvg:svgBlip xmlns:asvg="http://schemas.microsoft.com/office/drawing/2016/SVG/main" r:embed="rId2"/>
-              </a:ext>
-            </a:extLst>
-          </a:blip>
-          <a:srcRect/>
-          <a:stretch>
-            <a:fillRect/>
-          </a:stretch>
-        </a:blipFill>
-        <a:ln>
-          <a:noFill/>
-        </a:ln>
-      </dgm:spPr>
-      <dgm:extLst>
-        <a:ext uri="{E40237B7-FDA0-4F09-8148-C483321AD2D9}">
-          <dgm14:cNvPr xmlns:dgm14="http://schemas.microsoft.com/office/drawing/2010/diagram" id="0" name="" descr="Dog"/>
-        </a:ext>
-      </dgm:extLst>
-    </dgm:pt>
-    <dgm:pt modelId="{677A3090-5F01-43FD-9FA6-C0420AD80FD6}" type="pres">
-      <dgm:prSet presAssocID="{40FC4FFE-8987-4A26-B7F4-8A516F18ADAE}" presName="spaceRect" presStyleCnt="0"/>
-      <dgm:spPr/>
-    </dgm:pt>
-    <dgm:pt modelId="{127117FB-F8A7-4A20-A8A7-EC686DDC76D0}" type="pres">
-      <dgm:prSet presAssocID="{40FC4FFE-8987-4A26-B7F4-8A516F18ADAE}" presName="textRect" presStyleLbl="revTx" presStyleIdx="0" presStyleCnt="3">
-        <dgm:presLayoutVars>
-          <dgm:chMax val="1"/>
-          <dgm:chPref val="1"/>
-        </dgm:presLayoutVars>
-      </dgm:prSet>
-      <dgm:spPr/>
-    </dgm:pt>
-    <dgm:pt modelId="{FD1EED9C-83D3-41AD-A09B-D3B36354168F}" type="pres">
-      <dgm:prSet presAssocID="{5B62599A-5C9B-48E7-896E-EA782AC60C8B}" presName="sibTrans" presStyleCnt="0"/>
-      <dgm:spPr/>
-    </dgm:pt>
-    <dgm:pt modelId="{C998AB0A-577D-44AA-A068-F634DDE7BD47}" type="pres">
-      <dgm:prSet presAssocID="{49225C73-1633-42F1-AB3B-7CB183E5F8B8}" presName="compNode" presStyleCnt="0"/>
-      <dgm:spPr/>
-    </dgm:pt>
-    <dgm:pt modelId="{BCD8CDD9-0C56-4401-ADB1-8B48DAB2C96F}" type="pres">
-      <dgm:prSet presAssocID="{49225C73-1633-42F1-AB3B-7CB183E5F8B8}" presName="iconBgRect" presStyleLbl="bgShp" presStyleIdx="1" presStyleCnt="3"/>
-      <dgm:spPr>
-        <a:solidFill>
-          <a:schemeClr val="accent1"/>
-        </a:solidFill>
-      </dgm:spPr>
-    </dgm:pt>
-    <dgm:pt modelId="{DB4CA7C4-FCA1-4127-B20A-2A5C031A3CF4}" type="pres">
-      <dgm:prSet presAssocID="{49225C73-1633-42F1-AB3B-7CB183E5F8B8}" presName="iconRect" presStyleLbl="node1" presStyleIdx="1" presStyleCnt="3"/>
-      <dgm:spPr>
-        <a:blipFill>
-          <a:blip xmlns:r="http://schemas.openxmlformats.org/officeDocument/2006/relationships" r:embed="rId3">
-            <a:extLst>
-              <a:ext uri="{28A0092B-C50C-407E-A947-70E740481C1C}">
-                <a14:useLocalDpi xmlns:a14="http://schemas.microsoft.com/office/drawing/2010/main" val="0"/>
-              </a:ext>
-              <a:ext uri="{96DAC541-7B7A-43D3-8B79-37D633B846F1}">
-                <asvg:svgBlip xmlns:asvg="http://schemas.microsoft.com/office/drawing/2016/SVG/main" r:embed="rId4"/>
-              </a:ext>
-            </a:extLst>
-          </a:blip>
-          <a:srcRect/>
-          <a:stretch>
-            <a:fillRect/>
-          </a:stretch>
-        </a:blipFill>
-        <a:ln>
-          <a:noFill/>
-        </a:ln>
-      </dgm:spPr>
-      <dgm:extLst>
-        <a:ext uri="{E40237B7-FDA0-4F09-8148-C483321AD2D9}">
-          <dgm14:cNvPr xmlns:dgm14="http://schemas.microsoft.com/office/drawing/2010/diagram" id="0" name="" descr="Paw prints"/>
-        </a:ext>
-      </dgm:extLst>
-    </dgm:pt>
-    <dgm:pt modelId="{9B0C8FBF-0BDD-48A5-967E-F3FE71659F6A}" type="pres">
-      <dgm:prSet presAssocID="{49225C73-1633-42F1-AB3B-7CB183E5F8B8}" presName="spaceRect" presStyleCnt="0"/>
-      <dgm:spPr/>
-    </dgm:pt>
-    <dgm:pt modelId="{7E6FE37A-5DB0-4899-9FCB-0CE39BC185F8}" type="pres">
-      <dgm:prSet presAssocID="{49225C73-1633-42F1-AB3B-7CB183E5F8B8}" presName="textRect" presStyleLbl="revTx" presStyleIdx="1" presStyleCnt="3">
-        <dgm:presLayoutVars>
-          <dgm:chMax val="1"/>
-          <dgm:chPref val="1"/>
-        </dgm:presLayoutVars>
-      </dgm:prSet>
-      <dgm:spPr/>
-    </dgm:pt>
-    <dgm:pt modelId="{5A266296-0042-402F-92EF-D59AB148E92E}" type="pres">
-      <dgm:prSet presAssocID="{9646853A-8964-4519-A5B1-0B7D18B2983D}" presName="sibTrans" presStyleCnt="0"/>
-      <dgm:spPr/>
-    </dgm:pt>
-    <dgm:pt modelId="{ECFA770B-DE2C-4683-A038-58D0FE44BC27}" type="pres">
-      <dgm:prSet presAssocID="{1C383F32-22E8-4F62-A3E0-BDC3D5F48992}" presName="compNode" presStyleCnt="0"/>
-      <dgm:spPr/>
-    </dgm:pt>
-    <dgm:pt modelId="{FF93E135-77D6-48A0-8871-9BC93D705D06}" type="pres">
-      <dgm:prSet presAssocID="{1C383F32-22E8-4F62-A3E0-BDC3D5F48992}" presName="iconBgRect" presStyleLbl="bgShp" presStyleIdx="2" presStyleCnt="3"/>
-      <dgm:spPr>
-        <a:solidFill>
-          <a:schemeClr val="accent1"/>
-        </a:solidFill>
-      </dgm:spPr>
-    </dgm:pt>
-    <dgm:pt modelId="{39509775-983E-4110-B989-EE2CD6514BE0}" type="pres">
-      <dgm:prSet presAssocID="{1C383F32-22E8-4F62-A3E0-BDC3D5F48992}" presName="iconRect" presStyleLbl="node1" presStyleIdx="2" presStyleCnt="3"/>
-      <dgm:spPr>
-        <a:blipFill>
-          <a:blip xmlns:r="http://schemas.openxmlformats.org/officeDocument/2006/relationships" r:embed="rId5">
-            <a:extLst>
-              <a:ext uri="{96DAC541-7B7A-43D3-8B79-37D633B846F1}">
-                <asvg:svgBlip xmlns:asvg="http://schemas.microsoft.com/office/drawing/2016/SVG/main" r:embed="rId6"/>
-              </a:ext>
-            </a:extLst>
-          </a:blip>
-          <a:srcRect/>
-          <a:stretch>
-            <a:fillRect/>
-          </a:stretch>
-        </a:blipFill>
-        <a:ln>
-          <a:noFill/>
-        </a:ln>
-      </dgm:spPr>
-      <dgm:extLst>
-        <a:ext uri="{E40237B7-FDA0-4F09-8148-C483321AD2D9}">
-          <dgm14:cNvPr xmlns:dgm14="http://schemas.microsoft.com/office/drawing/2010/diagram" id="0" name="" descr="Veterinarian"/>
-        </a:ext>
-      </dgm:extLst>
-    </dgm:pt>
-    <dgm:pt modelId="{493B43B2-705C-4AE5-8A77-D8DEEDA1B5CF}" type="pres">
-      <dgm:prSet presAssocID="{1C383F32-22E8-4F62-A3E0-BDC3D5F48992}" presName="spaceRect" presStyleCnt="0"/>
-      <dgm:spPr/>
-    </dgm:pt>
-    <dgm:pt modelId="{1AEDC777-00B3-41D7-9AE1-23D741E941C3}" type="pres">
-      <dgm:prSet presAssocID="{1C383F32-22E8-4F62-A3E0-BDC3D5F48992}" presName="textRect" presStyleLbl="revTx" presStyleIdx="2" presStyleCnt="3">
-        <dgm:presLayoutVars>
-          <dgm:chMax val="1"/>
-          <dgm:chPref val="1"/>
-        </dgm:presLayoutVars>
-      </dgm:prSet>
-      <dgm:spPr/>
-    </dgm:pt>
-  </dgm:ptLst>
-  <dgm:cxnLst>
-    <dgm:cxn modelId="{A9154303-8225-4248-91DC-1B0156A35F07}" srcId="{01A66772-F185-4D58-B8BB-E9370D7A7A2B}" destId="{49225C73-1633-42F1-AB3B-7CB183E5F8B8}" srcOrd="1" destOrd="0" parTransId="{1A0E2090-1D4F-438A-8766-B6030CE01ADD}" sibTransId="{9646853A-8964-4519-A5B1-0B7D18B2983D}"/>
-    <dgm:cxn modelId="{7A710F69-5154-4855-ACF5-BC7C1BF85A80}" type="presOf" srcId="{49225C73-1633-42F1-AB3B-7CB183E5F8B8}" destId="{7E6FE37A-5DB0-4899-9FCB-0CE39BC185F8}" srcOrd="0" destOrd="0" presId="urn:microsoft.com/office/officeart/2018/5/layout/IconCircleLabelList"/>
-    <dgm:cxn modelId="{C7AD8469-3C68-4AF9-AB82-79B0043AA120}" srcId="{01A66772-F185-4D58-B8BB-E9370D7A7A2B}" destId="{40FC4FFE-8987-4A26-B7F4-8A516F18ADAE}" srcOrd="0" destOrd="0" parTransId="{CAD7EF86-FB23-41F6-BF42-040B36DEFDB1}" sibTransId="{5B62599A-5C9B-48E7-896E-EA782AC60C8B}"/>
-    <dgm:cxn modelId="{676D3A6A-6EA7-4483-BB12-0BD4A7D7AF9D}" type="presOf" srcId="{01A66772-F185-4D58-B8BB-E9370D7A7A2B}" destId="{50B3CE7C-E10B-4E23-BD93-03664997C932}" srcOrd="0" destOrd="0" presId="urn:microsoft.com/office/officeart/2018/5/layout/IconCircleLabelList"/>
-    <dgm:cxn modelId="{1496FC70-DB8B-48D4-98DE-DD2856E389EE}" type="presOf" srcId="{1C383F32-22E8-4F62-A3E0-BDC3D5F48992}" destId="{1AEDC777-00B3-41D7-9AE1-23D741E941C3}" srcOrd="0" destOrd="0" presId="urn:microsoft.com/office/officeart/2018/5/layout/IconCircleLabelList"/>
-    <dgm:cxn modelId="{C4CCE57E-E871-46D6-BAD5-880252C95D22}" srcId="{01A66772-F185-4D58-B8BB-E9370D7A7A2B}" destId="{1C383F32-22E8-4F62-A3E0-BDC3D5F48992}" srcOrd="2" destOrd="0" parTransId="{A7920A2F-3244-4159-AF04-6A1D38B7B317}" sibTransId="{8500F72A-2C6D-4FDF-9C1D-CA691380EB0B}"/>
-    <dgm:cxn modelId="{355227E3-55E0-4343-BC8D-FC0EB1694F48}" type="presOf" srcId="{40FC4FFE-8987-4A26-B7F4-8A516F18ADAE}" destId="{127117FB-F8A7-4A20-A8A7-EC686DDC76D0}" srcOrd="0" destOrd="0" presId="urn:microsoft.com/office/officeart/2018/5/layout/IconCircleLabelList"/>
-    <dgm:cxn modelId="{555498CB-3ED1-404E-A25F-EB243EFC5FB1}" type="presParOf" srcId="{50B3CE7C-E10B-4E23-BD93-03664997C932}" destId="{DE9CE479-E4AE-4283-AEF1-10C1535B4324}" srcOrd="0" destOrd="0" presId="urn:microsoft.com/office/officeart/2018/5/layout/IconCircleLabelList"/>
-    <dgm:cxn modelId="{11F12D49-CD08-4D50-BD13-3ECBC3A476A4}" type="presParOf" srcId="{DE9CE479-E4AE-4283-AEF1-10C1535B4324}" destId="{B59FCF02-CAD2-4D6F-9542-AD86711168CA}" srcOrd="0" destOrd="0" presId="urn:microsoft.com/office/officeart/2018/5/layout/IconCircleLabelList"/>
-    <dgm:cxn modelId="{F443A659-540B-487B-97F9-49219CF60D6B}" type="presParOf" srcId="{DE9CE479-E4AE-4283-AEF1-10C1535B4324}" destId="{7C175B98-93F4-4D7C-BB95-1514AB879CD5}" srcOrd="1" destOrd="0" presId="urn:microsoft.com/office/officeart/2018/5/layout/IconCircleLabelList"/>
-    <dgm:cxn modelId="{A503D7AB-7D64-4163-93B5-1CEEDAE81823}" type="presParOf" srcId="{DE9CE479-E4AE-4283-AEF1-10C1535B4324}" destId="{677A3090-5F01-43FD-9FA6-C0420AD80FD6}" srcOrd="2" destOrd="0" presId="urn:microsoft.com/office/officeart/2018/5/layout/IconCircleLabelList"/>
-    <dgm:cxn modelId="{780188ED-7DCE-45BB-B6AF-91BE48969612}" type="presParOf" srcId="{DE9CE479-E4AE-4283-AEF1-10C1535B4324}" destId="{127117FB-F8A7-4A20-A8A7-EC686DDC76D0}" srcOrd="3" destOrd="0" presId="urn:microsoft.com/office/officeart/2018/5/layout/IconCircleLabelList"/>
-    <dgm:cxn modelId="{155719F8-A89B-4E96-BC49-C48BC717F480}" type="presParOf" srcId="{50B3CE7C-E10B-4E23-BD93-03664997C932}" destId="{FD1EED9C-83D3-41AD-A09B-D3B36354168F}" srcOrd="1" destOrd="0" presId="urn:microsoft.com/office/officeart/2018/5/layout/IconCircleLabelList"/>
-    <dgm:cxn modelId="{2772E199-56B0-4310-A55E-67D00CA3E59E}" type="presParOf" srcId="{50B3CE7C-E10B-4E23-BD93-03664997C932}" destId="{C998AB0A-577D-44AA-A068-F634DDE7BD47}" srcOrd="2" destOrd="0" presId="urn:microsoft.com/office/officeart/2018/5/layout/IconCircleLabelList"/>
-    <dgm:cxn modelId="{4E351D18-D97F-4B92-A608-2E9600B91C28}" type="presParOf" srcId="{C998AB0A-577D-44AA-A068-F634DDE7BD47}" destId="{BCD8CDD9-0C56-4401-ADB1-8B48DAB2C96F}" srcOrd="0" destOrd="0" presId="urn:microsoft.com/office/officeart/2018/5/layout/IconCircleLabelList"/>
-    <dgm:cxn modelId="{B3DC724C-4569-4E9D-BD5A-49E4CD991FD0}" type="presParOf" srcId="{C998AB0A-577D-44AA-A068-F634DDE7BD47}" destId="{DB4CA7C4-FCA1-4127-B20A-2A5C031A3CF4}" srcOrd="1" destOrd="0" presId="urn:microsoft.com/office/officeart/2018/5/layout/IconCircleLabelList"/>
-    <dgm:cxn modelId="{AD1AB552-CCE0-4911-BB9E-5D4A60B21F4F}" type="presParOf" srcId="{C998AB0A-577D-44AA-A068-F634DDE7BD47}" destId="{9B0C8FBF-0BDD-48A5-967E-F3FE71659F6A}" srcOrd="2" destOrd="0" presId="urn:microsoft.com/office/officeart/2018/5/layout/IconCircleLabelList"/>
-    <dgm:cxn modelId="{8558F796-2D01-40FE-A21A-7530EEBC3BC3}" type="presParOf" srcId="{C998AB0A-577D-44AA-A068-F634DDE7BD47}" destId="{7E6FE37A-5DB0-4899-9FCB-0CE39BC185F8}" srcOrd="3" destOrd="0" presId="urn:microsoft.com/office/officeart/2018/5/layout/IconCircleLabelList"/>
-    <dgm:cxn modelId="{1532E2BE-82E9-40A4-A6F7-40B60FC879AE}" type="presParOf" srcId="{50B3CE7C-E10B-4E23-BD93-03664997C932}" destId="{5A266296-0042-402F-92EF-D59AB148E92E}" srcOrd="3" destOrd="0" presId="urn:microsoft.com/office/officeart/2018/5/layout/IconCircleLabelList"/>
-    <dgm:cxn modelId="{3A7F4DB9-1469-4F58-B633-24B7EEE084D1}" type="presParOf" srcId="{50B3CE7C-E10B-4E23-BD93-03664997C932}" destId="{ECFA770B-DE2C-4683-A038-58D0FE44BC27}" srcOrd="4" destOrd="0" presId="urn:microsoft.com/office/officeart/2018/5/layout/IconCircleLabelList"/>
-    <dgm:cxn modelId="{91311827-CDAC-4BA8-B4A3-117AFD1CEE2D}" type="presParOf" srcId="{ECFA770B-DE2C-4683-A038-58D0FE44BC27}" destId="{FF93E135-77D6-48A0-8871-9BC93D705D06}" srcOrd="0" destOrd="0" presId="urn:microsoft.com/office/officeart/2018/5/layout/IconCircleLabelList"/>
-    <dgm:cxn modelId="{83B7CA40-11B7-4507-8422-A40F02D469B2}" type="presParOf" srcId="{ECFA770B-DE2C-4683-A038-58D0FE44BC27}" destId="{39509775-983E-4110-B989-EE2CD6514BE0}" srcOrd="1" destOrd="0" presId="urn:microsoft.com/office/officeart/2018/5/layout/IconCircleLabelList"/>
-    <dgm:cxn modelId="{A44BB251-01EB-4DEF-A28C-6D495183E4DC}" type="presParOf" srcId="{ECFA770B-DE2C-4683-A038-58D0FE44BC27}" destId="{493B43B2-705C-4AE5-8A77-D8DEEDA1B5CF}" srcOrd="2" destOrd="0" presId="urn:microsoft.com/office/officeart/2018/5/layout/IconCircleLabelList"/>
-    <dgm:cxn modelId="{1EFA52DF-3C80-4DAA-BED6-AFE2F81796B2}" type="presParOf" srcId="{ECFA770B-DE2C-4683-A038-58D0FE44BC27}" destId="{1AEDC777-00B3-41D7-9AE1-23D741E941C3}" srcOrd="3" destOrd="0" presId="urn:microsoft.com/office/officeart/2018/5/layout/IconCircleLabelList"/>
-  </dgm:cxnLst>
-  <dgm:bg/>
-  <dgm:whole/>
-  <dgm:extLst>
-    <a:ext uri="http://schemas.microsoft.com/office/drawing/2008/diagram">
-      <dsp:dataModelExt xmlns:dsp="http://schemas.microsoft.com/office/drawing/2008/diagram" relId="rId8" minVer="http://schemas.openxmlformats.org/drawingml/2006/diagram"/>
-    </a:ext>
-  </dgm:extLst>
-</dgm:dataModel>
-</file>
-
-<file path=ppt/diagrams/drawing1.xml><?xml version="1.0" encoding="utf-8"?>
-<dsp:drawing xmlns:dgm="http://schemas.openxmlformats.org/drawingml/2006/diagram" xmlns:dsp="http://schemas.microsoft.com/office/drawing/2008/diagram" xmlns:a="http://schemas.openxmlformats.org/drawingml/2006/main">
-  <dsp:spTree>
-    <dsp:nvGrpSpPr>
-      <dsp:cNvPr id="0" name=""/>
-      <dsp:cNvGrpSpPr/>
-    </dsp:nvGrpSpPr>
-    <dsp:grpSpPr/>
-    <dsp:sp modelId="{B59FCF02-CAD2-4D6F-9542-AD86711168CA}">
-      <dsp:nvSpPr>
-        <dsp:cNvPr id="0" name=""/>
-        <dsp:cNvSpPr/>
-      </dsp:nvSpPr>
-      <dsp:spPr>
-        <a:xfrm>
-          <a:off x="686474" y="151893"/>
-          <a:ext cx="1990125" cy="1990125"/>
-        </a:xfrm>
-        <a:prstGeom prst="ellipse">
-          <a:avLst/>
-        </a:prstGeom>
-        <a:solidFill>
-          <a:schemeClr val="accent1"/>
-        </a:solidFill>
-        <a:ln>
-          <a:noFill/>
-        </a:ln>
-        <a:effectLst/>
-      </dsp:spPr>
-      <dsp:style>
-        <a:lnRef idx="0">
-          <a:scrgbClr r="0" g="0" b="0"/>
-        </a:lnRef>
-        <a:fillRef idx="1">
-          <a:scrgbClr r="0" g="0" b="0"/>
-        </a:fillRef>
-        <a:effectRef idx="0">
-          <a:scrgbClr r="0" g="0" b="0"/>
-        </a:effectRef>
-        <a:fontRef idx="minor"/>
-      </dsp:style>
-    </dsp:sp>
-    <dsp:sp modelId="{7C175B98-93F4-4D7C-BB95-1514AB879CD5}">
-      <dsp:nvSpPr>
-        <dsp:cNvPr id="0" name=""/>
-        <dsp:cNvSpPr/>
-      </dsp:nvSpPr>
-      <dsp:spPr>
-        <a:xfrm>
-          <a:off x="1110599" y="576018"/>
-          <a:ext cx="1141875" cy="1141875"/>
-        </a:xfrm>
-        <a:prstGeom prst="rect">
-          <a:avLst/>
-        </a:prstGeom>
-        <a:blipFill>
-          <a:blip xmlns:r="http://schemas.openxmlformats.org/officeDocument/2006/relationships" r:embed="rId1">
-            <a:extLst>
-              <a:ext uri="{96DAC541-7B7A-43D3-8B79-37D633B846F1}">
-                <asvg:svgBlip xmlns:asvg="http://schemas.microsoft.com/office/drawing/2016/SVG/main" r:embed="rId2"/>
-              </a:ext>
-            </a:extLst>
-          </a:blip>
-          <a:srcRect/>
-          <a:stretch>
-            <a:fillRect/>
-          </a:stretch>
-        </a:blipFill>
-        <a:ln w="22225" cap="rnd" cmpd="sng" algn="ctr">
-          <a:noFill/>
-          <a:prstDash val="solid"/>
-        </a:ln>
-        <a:effectLst/>
-      </dsp:spPr>
-      <dsp:style>
-        <a:lnRef idx="2">
-          <a:scrgbClr r="0" g="0" b="0"/>
-        </a:lnRef>
-        <a:fillRef idx="1">
-          <a:scrgbClr r="0" g="0" b="0"/>
-        </a:fillRef>
-        <a:effectRef idx="0">
-          <a:scrgbClr r="0" g="0" b="0"/>
-        </a:effectRef>
-        <a:fontRef idx="minor">
-          <a:schemeClr val="lt1"/>
-        </a:fontRef>
-      </dsp:style>
-    </dsp:sp>
-    <dsp:sp modelId="{127117FB-F8A7-4A20-A8A7-EC686DDC76D0}">
-      <dsp:nvSpPr>
-        <dsp:cNvPr id="0" name=""/>
-        <dsp:cNvSpPr/>
-      </dsp:nvSpPr>
-      <dsp:spPr>
-        <a:xfrm>
-          <a:off x="50287" y="2761893"/>
-          <a:ext cx="3262500" cy="720000"/>
-        </a:xfrm>
-        <a:prstGeom prst="rect">
-          <a:avLst/>
-        </a:prstGeom>
-        <a:noFill/>
-        <a:ln>
-          <a:noFill/>
-        </a:ln>
-        <a:effectLst/>
-      </dsp:spPr>
-      <dsp:style>
-        <a:lnRef idx="0">
-          <a:scrgbClr r="0" g="0" b="0"/>
-        </a:lnRef>
-        <a:fillRef idx="0">
-          <a:scrgbClr r="0" g="0" b="0"/>
-        </a:fillRef>
-        <a:effectRef idx="0">
-          <a:scrgbClr r="0" g="0" b="0"/>
-        </a:effectRef>
-        <a:fontRef idx="minor"/>
-      </dsp:style>
-      <dsp:txBody>
-        <a:bodyPr spcFirstLastPara="0" vert="horz" wrap="square" lIns="0" tIns="0" rIns="0" bIns="0" numCol="1" spcCol="1270" anchor="t" anchorCtr="0">
-          <a:noAutofit/>
-        </a:bodyPr>
-        <a:lstStyle/>
-        <a:p>
-          <a:pPr marL="0" lvl="0" indent="0" algn="ctr" defTabSz="800100">
-            <a:lnSpc>
-              <a:spcPct val="100000"/>
-            </a:lnSpc>
-            <a:spcBef>
-              <a:spcPct val="0"/>
-            </a:spcBef>
-            <a:spcAft>
-              <a:spcPct val="35000"/>
-            </a:spcAft>
-            <a:buNone/>
-            <a:defRPr cap="all"/>
-          </a:pPr>
-          <a:r>
-            <a:rPr lang="en-US" sz="1800" kern="1200" dirty="0"/>
-            <a:t>Lorem ipsum dolor sit amet, consectetuer adipiscing elit. </a:t>
-          </a:r>
-        </a:p>
-      </dsp:txBody>
-      <dsp:txXfrm>
-        <a:off x="50287" y="2761893"/>
-        <a:ext cx="3262500" cy="720000"/>
-      </dsp:txXfrm>
-    </dsp:sp>
-    <dsp:sp modelId="{BCD8CDD9-0C56-4401-ADB1-8B48DAB2C96F}">
-      <dsp:nvSpPr>
-        <dsp:cNvPr id="0" name=""/>
-        <dsp:cNvSpPr/>
-      </dsp:nvSpPr>
-      <dsp:spPr>
-        <a:xfrm>
-          <a:off x="4519912" y="151893"/>
-          <a:ext cx="1990125" cy="1990125"/>
-        </a:xfrm>
-        <a:prstGeom prst="ellipse">
-          <a:avLst/>
-        </a:prstGeom>
-        <a:solidFill>
-          <a:schemeClr val="accent1"/>
-        </a:solidFill>
-        <a:ln>
-          <a:noFill/>
-        </a:ln>
-        <a:effectLst/>
-      </dsp:spPr>
-      <dsp:style>
-        <a:lnRef idx="0">
-          <a:scrgbClr r="0" g="0" b="0"/>
-        </a:lnRef>
-        <a:fillRef idx="1">
-          <a:scrgbClr r="0" g="0" b="0"/>
-        </a:fillRef>
-        <a:effectRef idx="0">
-          <a:scrgbClr r="0" g="0" b="0"/>
-        </a:effectRef>
-        <a:fontRef idx="minor"/>
-      </dsp:style>
-    </dsp:sp>
-    <dsp:sp modelId="{DB4CA7C4-FCA1-4127-B20A-2A5C031A3CF4}">
-      <dsp:nvSpPr>
-        <dsp:cNvPr id="0" name=""/>
-        <dsp:cNvSpPr/>
-      </dsp:nvSpPr>
-      <dsp:spPr>
-        <a:xfrm>
-          <a:off x="4944037" y="576018"/>
-          <a:ext cx="1141875" cy="1141875"/>
-        </a:xfrm>
-        <a:prstGeom prst="rect">
-          <a:avLst/>
-        </a:prstGeom>
-        <a:blipFill>
-          <a:blip xmlns:r="http://schemas.openxmlformats.org/officeDocument/2006/relationships" r:embed="rId3">
-            <a:extLst>
-              <a:ext uri="{28A0092B-C50C-407E-A947-70E740481C1C}">
-                <a14:useLocalDpi xmlns:a14="http://schemas.microsoft.com/office/drawing/2010/main" val="0"/>
-              </a:ext>
-              <a:ext uri="{96DAC541-7B7A-43D3-8B79-37D633B846F1}">
-                <asvg:svgBlip xmlns:asvg="http://schemas.microsoft.com/office/drawing/2016/SVG/main" r:embed="rId4"/>
-              </a:ext>
-            </a:extLst>
-          </a:blip>
-          <a:srcRect/>
-          <a:stretch>
-            <a:fillRect/>
-          </a:stretch>
-        </a:blipFill>
-        <a:ln w="22225" cap="rnd" cmpd="sng" algn="ctr">
-          <a:noFill/>
-          <a:prstDash val="solid"/>
-        </a:ln>
-        <a:effectLst/>
-      </dsp:spPr>
-      <dsp:style>
-        <a:lnRef idx="2">
-          <a:scrgbClr r="0" g="0" b="0"/>
-        </a:lnRef>
-        <a:fillRef idx="1">
-          <a:scrgbClr r="0" g="0" b="0"/>
-        </a:fillRef>
-        <a:effectRef idx="0">
-          <a:scrgbClr r="0" g="0" b="0"/>
-        </a:effectRef>
-        <a:fontRef idx="minor">
-          <a:schemeClr val="lt1"/>
-        </a:fontRef>
-      </dsp:style>
-    </dsp:sp>
-    <dsp:sp modelId="{7E6FE37A-5DB0-4899-9FCB-0CE39BC185F8}">
-      <dsp:nvSpPr>
-        <dsp:cNvPr id="0" name=""/>
-        <dsp:cNvSpPr/>
-      </dsp:nvSpPr>
-      <dsp:spPr>
-        <a:xfrm>
-          <a:off x="3883725" y="2761893"/>
-          <a:ext cx="3262500" cy="720000"/>
-        </a:xfrm>
-        <a:prstGeom prst="rect">
-          <a:avLst/>
-        </a:prstGeom>
-        <a:noFill/>
-        <a:ln>
-          <a:noFill/>
-        </a:ln>
-        <a:effectLst/>
-      </dsp:spPr>
-      <dsp:style>
-        <a:lnRef idx="0">
-          <a:scrgbClr r="0" g="0" b="0"/>
-        </a:lnRef>
-        <a:fillRef idx="0">
-          <a:scrgbClr r="0" g="0" b="0"/>
-        </a:fillRef>
-        <a:effectRef idx="0">
-          <a:scrgbClr r="0" g="0" b="0"/>
-        </a:effectRef>
-        <a:fontRef idx="minor"/>
-      </dsp:style>
-      <dsp:txBody>
-        <a:bodyPr spcFirstLastPara="0" vert="horz" wrap="square" lIns="0" tIns="0" rIns="0" bIns="0" numCol="1" spcCol="1270" anchor="t" anchorCtr="0">
-          <a:noAutofit/>
-        </a:bodyPr>
-        <a:lstStyle/>
-        <a:p>
-          <a:pPr marL="0" lvl="0" indent="0" algn="ctr" defTabSz="800100">
-            <a:lnSpc>
-              <a:spcPct val="100000"/>
-            </a:lnSpc>
-            <a:spcBef>
-              <a:spcPct val="0"/>
-            </a:spcBef>
-            <a:spcAft>
-              <a:spcPct val="35000"/>
-            </a:spcAft>
-            <a:buNone/>
-            <a:defRPr cap="all"/>
-          </a:pPr>
-          <a:r>
-            <a:rPr lang="en-US" sz="1800" kern="1200" dirty="0"/>
-            <a:t>Nunc viverra imperdiet enim. Fusce est. Vivamus a tellus.</a:t>
-          </a:r>
-        </a:p>
-      </dsp:txBody>
-      <dsp:txXfrm>
-        <a:off x="3883725" y="2761893"/>
-        <a:ext cx="3262500" cy="720000"/>
-      </dsp:txXfrm>
-    </dsp:sp>
-    <dsp:sp modelId="{FF93E135-77D6-48A0-8871-9BC93D705D06}">
-      <dsp:nvSpPr>
-        <dsp:cNvPr id="0" name=""/>
-        <dsp:cNvSpPr/>
-      </dsp:nvSpPr>
-      <dsp:spPr>
-        <a:xfrm>
-          <a:off x="8353350" y="151893"/>
-          <a:ext cx="1990125" cy="1990125"/>
-        </a:xfrm>
-        <a:prstGeom prst="ellipse">
-          <a:avLst/>
-        </a:prstGeom>
-        <a:solidFill>
-          <a:schemeClr val="accent1"/>
-        </a:solidFill>
-        <a:ln>
-          <a:noFill/>
-        </a:ln>
-        <a:effectLst/>
-      </dsp:spPr>
-      <dsp:style>
-        <a:lnRef idx="0">
-          <a:scrgbClr r="0" g="0" b="0"/>
-        </a:lnRef>
-        <a:fillRef idx="1">
-          <a:scrgbClr r="0" g="0" b="0"/>
-        </a:fillRef>
-        <a:effectRef idx="0">
-          <a:scrgbClr r="0" g="0" b="0"/>
-        </a:effectRef>
-        <a:fontRef idx="minor"/>
-      </dsp:style>
-    </dsp:sp>
-    <dsp:sp modelId="{39509775-983E-4110-B989-EE2CD6514BE0}">
-      <dsp:nvSpPr>
-        <dsp:cNvPr id="0" name=""/>
-        <dsp:cNvSpPr/>
-      </dsp:nvSpPr>
-      <dsp:spPr>
-        <a:xfrm>
-          <a:off x="8777475" y="576018"/>
-          <a:ext cx="1141875" cy="1141875"/>
-        </a:xfrm>
-        <a:prstGeom prst="rect">
-          <a:avLst/>
-        </a:prstGeom>
-        <a:blipFill>
-          <a:blip xmlns:r="http://schemas.openxmlformats.org/officeDocument/2006/relationships" r:embed="rId5">
-            <a:extLst>
-              <a:ext uri="{96DAC541-7B7A-43D3-8B79-37D633B846F1}">
-                <asvg:svgBlip xmlns:asvg="http://schemas.microsoft.com/office/drawing/2016/SVG/main" r:embed="rId6"/>
-              </a:ext>
-            </a:extLst>
-          </a:blip>
-          <a:srcRect/>
-          <a:stretch>
-            <a:fillRect/>
-          </a:stretch>
-        </a:blipFill>
-        <a:ln w="22225" cap="rnd" cmpd="sng" algn="ctr">
-          <a:noFill/>
-          <a:prstDash val="solid"/>
-        </a:ln>
-        <a:effectLst/>
-      </dsp:spPr>
-      <dsp:style>
-        <a:lnRef idx="2">
-          <a:scrgbClr r="0" g="0" b="0"/>
-        </a:lnRef>
-        <a:fillRef idx="1">
-          <a:scrgbClr r="0" g="0" b="0"/>
-        </a:fillRef>
-        <a:effectRef idx="0">
-          <a:scrgbClr r="0" g="0" b="0"/>
-        </a:effectRef>
-        <a:fontRef idx="minor">
-          <a:schemeClr val="lt1"/>
-        </a:fontRef>
-      </dsp:style>
-    </dsp:sp>
-    <dsp:sp modelId="{1AEDC777-00B3-41D7-9AE1-23D741E941C3}">
-      <dsp:nvSpPr>
-        <dsp:cNvPr id="0" name=""/>
-        <dsp:cNvSpPr/>
-      </dsp:nvSpPr>
-      <dsp:spPr>
-        <a:xfrm>
-          <a:off x="7717162" y="2761893"/>
-          <a:ext cx="3262500" cy="720000"/>
-        </a:xfrm>
-        <a:prstGeom prst="rect">
-          <a:avLst/>
-        </a:prstGeom>
-        <a:noFill/>
-        <a:ln>
-          <a:noFill/>
-        </a:ln>
-        <a:effectLst/>
-      </dsp:spPr>
-      <dsp:style>
-        <a:lnRef idx="0">
-          <a:scrgbClr r="0" g="0" b="0"/>
-        </a:lnRef>
-        <a:fillRef idx="0">
-          <a:scrgbClr r="0" g="0" b="0"/>
-        </a:fillRef>
-        <a:effectRef idx="0">
-          <a:scrgbClr r="0" g="0" b="0"/>
-        </a:effectRef>
-        <a:fontRef idx="minor"/>
-      </dsp:style>
-      <dsp:txBody>
-        <a:bodyPr spcFirstLastPara="0" vert="horz" wrap="square" lIns="0" tIns="0" rIns="0" bIns="0" numCol="1" spcCol="1270" anchor="t" anchorCtr="0">
-          <a:noAutofit/>
-        </a:bodyPr>
-        <a:lstStyle/>
-        <a:p>
-          <a:pPr marL="0" lvl="0" indent="0" algn="ctr" defTabSz="800100">
-            <a:lnSpc>
-              <a:spcPct val="100000"/>
-            </a:lnSpc>
-            <a:spcBef>
-              <a:spcPct val="0"/>
-            </a:spcBef>
-            <a:spcAft>
-              <a:spcPct val="35000"/>
-            </a:spcAft>
-            <a:buNone/>
-            <a:defRPr cap="all"/>
-          </a:pPr>
-          <a:r>
-            <a:rPr lang="en-US" sz="1800" kern="1200" dirty="0"/>
-            <a:t>Pellentesque habitant morbi tristique senectus et netus.</a:t>
-          </a:r>
-        </a:p>
-      </dsp:txBody>
-      <dsp:txXfrm>
-        <a:off x="7717162" y="2761893"/>
-        <a:ext cx="3262500" cy="720000"/>
-      </dsp:txXfrm>
-    </dsp:sp>
-  </dsp:spTree>
-</dsp:drawing>
-</file>
-
-<file path=ppt/diagrams/layout1.xml><?xml version="1.0" encoding="utf-8"?>
-<dgm:layoutDef xmlns:dgm="http://schemas.openxmlformats.org/drawingml/2006/diagram" xmlns:a="http://schemas.openxmlformats.org/drawingml/2006/main" uniqueId="urn:microsoft.com/office/officeart/2018/5/layout/IconCircleLabelList">
-  <dgm:title val="Icon Circle Label List"/>
-  <dgm:desc val="Use to show non-sequential or grouped chunks of information accompanied by a related visuals. Works best with icons or small pictures with short text captions."/>
-  <dgm:catLst>
-    <dgm:cat type="icon" pri="500"/>
-  </dgm:catLst>
-  <dgm:sampData useDef="1">
-    <dgm:dataModel>
-      <dgm:ptLst/>
-      <dgm:bg/>
-      <dgm:whole/>
-    </dgm:dataModel>
-  </dgm:sampData>
-  <dgm:styleData useDef="1">
-    <dgm:dataModel>
-      <dgm:ptLst/>
-      <dgm:bg/>
-      <dgm:whole/>
-    </dgm:dataModel>
-  </dgm:styleData>
-  <dgm:clrData useDef="1">
-    <dgm:dataModel>
-      <dgm:ptLst/>
-      <dgm:bg/>
-      <dgm:whole/>
-    </dgm:dataModel>
-  </dgm:clrData>
-  <dgm:layoutNode name="root">
-    <dgm:varLst>
-      <dgm:dir/>
-      <dgm:resizeHandles val="exact"/>
-    </dgm:varLst>
-    <dgm:choose name="Name0">
-      <dgm:if name="Name1" axis="self" func="var" arg="dir" op="equ" val="norm">
-        <dgm:alg type="snake">
-          <dgm:param type="grDir" val="tL"/>
-          <dgm:param type="flowDir" val="row"/>
-          <dgm:param type="contDir" val="sameDir"/>
-          <dgm:param type="off" val="ctr"/>
-          <dgm:param type="vertAlign" val="mid"/>
-          <dgm:param type="horzAlign" val="ctr"/>
-        </dgm:alg>
-      </dgm:if>
-      <dgm:else name="Name2">
-        <dgm:alg type="snake">
-          <dgm:param type="grDir" val="tR"/>
-          <dgm:param type="flowDir" val="row"/>
-          <dgm:param type="contDir" val="sameDir"/>
-          <dgm:param type="off" val="ctr"/>
-          <dgm:param type="vertAlign" val="mid"/>
-          <dgm:param type="horzAlign" val="ctr"/>
-        </dgm:alg>
-      </dgm:else>
-    </dgm:choose>
-    <dgm:shape xmlns:r="http://schemas.openxmlformats.org/officeDocument/2006/relationships" r:blip="">
-      <dgm:adjLst/>
-    </dgm:shape>
-    <dgm:presOf/>
-    <dgm:choose name="Name3">
-      <dgm:if name="Name4" axis="ch" ptType="node" func="cnt" op="lte" val="2">
-        <dgm:constrLst>
-          <dgm:constr type="h" for="ch" forName="compNode" refType="h" fact="0.4"/>
-          <dgm:constr type="w" for="ch" forName="compNode" val="100"/>
-          <dgm:constr type="w" for="ch" forName="sibTrans" refType="w" refFor="ch" refForName="compNode" fact="0.175"/>
-          <dgm:constr type="sp" refType="w" refFor="ch" refForName="compNode" op="equ" fact="0.25"/>
-          <dgm:constr type="primFontSz" for="des" ptType="node" op="equ" val="44"/>
-          <dgm:constr type="h" for="des" forName="compNode" op="equ"/>
-          <dgm:constr type="h" for="des" forName="textRect" op="equ"/>
-        </dgm:constrLst>
-      </dgm:if>
-      <dgm:if name="Name5" axis="ch" ptType="node" func="cnt" op="lte" val="3">
-        <dgm:constrLst>
-          <dgm:constr type="h" for="ch" forName="compNode" refType="h" fact="0.4"/>
-          <dgm:constr type="w" for="ch" forName="compNode" val="100"/>
-          <dgm:constr type="w" for="ch" forName="sibTrans" refType="w" refFor="ch" refForName="compNode" fact="0.175"/>
-          <dgm:constr type="sp" refType="w" refFor="ch" refForName="compNode" op="equ" fact="0.25"/>
-          <dgm:constr type="primFontSz" for="des" ptType="node" op="equ" val="40"/>
-          <dgm:constr type="h" for="des" forName="compNode" op="equ"/>
-          <dgm:constr type="h" for="des" forName="textRect" op="equ"/>
-        </dgm:constrLst>
-      </dgm:if>
-      <dgm:if name="Name6" axis="ch" ptType="node" func="cnt" op="lte" val="4">
-        <dgm:constrLst>
-          <dgm:constr type="h" for="ch" forName="compNode" refType="h" fact="0.4"/>
-          <dgm:constr type="w" for="ch" forName="compNode" refType="w"/>
-          <dgm:constr type="w" for="ch" forName="sibTrans" refType="w" refFor="ch" refForName="compNode" fact="0.175"/>
-          <dgm:constr type="sp" refType="w" refFor="ch" refForName="compNode" op="equ" fact="0.25"/>
-          <dgm:constr type="primFontSz" for="des" ptType="node" op="equ" val="32"/>
-          <dgm:constr type="h" for="des" forName="compNode" op="equ"/>
-          <dgm:constr type="h" for="des" forName="textRect" op="equ"/>
-        </dgm:constrLst>
-      </dgm:if>
-      <dgm:else name="Name7">
-        <dgm:constrLst>
-          <dgm:constr type="h" for="ch" forName="compNode" refType="h" fact="0.4"/>
-          <dgm:constr type="w" for="ch" forName="compNode" refType="w"/>
-          <dgm:constr type="w" for="ch" forName="sibTrans" refType="w" refFor="ch" refForName="compNode" fact="0.175"/>
-          <dgm:constr type="sp" refType="w" refFor="ch" refForName="compNode" op="equ" fact="0.25"/>
-          <dgm:constr type="primFontSz" for="des" ptType="node" op="equ" val="24"/>
-          <dgm:constr type="h" for="des" forName="compNode" op="equ"/>
-          <dgm:constr type="h" for="des" forName="textRect" op="equ"/>
-        </dgm:constrLst>
-      </dgm:else>
-    </dgm:choose>
-    <dgm:ruleLst>
-      <dgm:rule type="w" for="ch" forName="compNode" val="50" fact="NaN" max="NaN"/>
-    </dgm:ruleLst>
-    <dgm:forEach name="Name8" axis="ch" ptType="node">
-      <dgm:layoutNode name="compNode">
-        <dgm:alg type="composite"/>
-        <dgm:shape xmlns:r="http://schemas.openxmlformats.org/officeDocument/2006/relationships" r:blip="">
-          <dgm:adjLst/>
-        </dgm:shape>
-        <dgm:presOf axis="self"/>
-        <dgm:constrLst>
-          <dgm:constr type="w" for="ch" forName="iconBgRect" refType="w" fact="0.61"/>
-          <dgm:constr type="h" for="ch" forName="iconBgRect" refType="w" refFor="ch" refForName="iconBgRect"/>
-          <dgm:constr type="t" for="ch" forName="iconBgRect"/>
-          <dgm:constr type="ctrX" for="ch" forName="iconBgRect" refType="w" fact="0.5"/>
-          <dgm:constr type="w" for="ch" forName="iconRect" refType="w" fact="0.35"/>
-          <dgm:constr type="h" for="ch" forName="iconRect" refType="w" refFor="ch" refForName="iconRect"/>
-          <dgm:constr type="ctrX" for="ch" forName="iconRect" refType="ctrX" refFor="ch" refForName="iconBgRect"/>
-          <dgm:constr type="ctrY" for="ch" forName="iconRect" refType="ctrY" refFor="ch" refForName="iconBgRect"/>
-          <dgm:constr type="h" for="ch" forName="spaceRect" refType="w" fact="0.19"/>
-          <dgm:constr type="w" for="ch" forName="spaceRect" refType="w"/>
-          <dgm:constr type="l" for="ch" forName="spaceRect"/>
-          <dgm:constr type="t" for="ch" forName="spaceRect" refType="b" refFor="ch" refForName="iconBgRect"/>
-          <dgm:constr type="h" for="ch" forName="textRect" val="20"/>
-          <dgm:constr type="w" for="ch" forName="textRect" refType="w"/>
-          <dgm:constr type="l" for="ch" forName="textRect"/>
-          <dgm:constr type="t" for="ch" forName="textRect" refType="b" refFor="ch" refForName="spaceRect"/>
-        </dgm:constrLst>
-        <dgm:ruleLst>
-          <dgm:rule type="h" val="INF" fact="NaN" max="NaN"/>
-        </dgm:ruleLst>
-        <dgm:layoutNode name="iconBgRect" styleLbl="bgShp">
-          <dgm:alg type="sp"/>
-          <dgm:shape xmlns:r="http://schemas.openxmlformats.org/officeDocument/2006/relationships" type="ellipse" r:blip="">
-            <dgm:adjLst/>
-          </dgm:shape>
-          <dgm:presOf/>
-          <dgm:constrLst/>
-          <dgm:ruleLst/>
-        </dgm:layoutNode>
-        <dgm:layoutNode name="iconRect" styleLbl="node1">
-          <dgm:alg type="sp"/>
-          <dgm:shape xmlns:r="http://schemas.openxmlformats.org/officeDocument/2006/relationships" type="rect" r:blip="" blipPhldr="1">
-            <dgm:adjLst/>
-          </dgm:shape>
-          <dgm:presOf/>
-          <dgm:constrLst/>
-          <dgm:ruleLst/>
-        </dgm:layoutNode>
-        <dgm:layoutNode name="spaceRect">
-          <dgm:alg type="sp"/>
-          <dgm:shape xmlns:r="http://schemas.openxmlformats.org/officeDocument/2006/relationships" r:blip="">
-            <dgm:adjLst/>
-          </dgm:shape>
-          <dgm:presOf/>
-          <dgm:constrLst/>
-          <dgm:ruleLst/>
-        </dgm:layoutNode>
-        <dgm:layoutNode name="textRect" styleLbl="revTx">
-          <dgm:varLst>
-            <dgm:chMax val="1"/>
-            <dgm:chPref val="1"/>
-          </dgm:varLst>
-          <dgm:alg type="tx">
-            <dgm:param type="txAnchorVert" val="t"/>
-          </dgm:alg>
-          <dgm:shape xmlns:r="http://schemas.openxmlformats.org/officeDocument/2006/relationships" type="rect" r:blip="">
-            <dgm:adjLst/>
-          </dgm:shape>
-          <dgm:presOf axis="self" ptType="node"/>
-          <dgm:constrLst>
-            <dgm:constr type="lMarg"/>
-            <dgm:constr type="rMarg"/>
-            <dgm:constr type="tMarg"/>
-            <dgm:constr type="bMarg"/>
-          </dgm:constrLst>
-          <dgm:ruleLst>
-            <dgm:rule type="primFontSz" val="11" fact="NaN" max="NaN"/>
-            <dgm:rule type="h" val="INF" fact="NaN" max="NaN"/>
-          </dgm:ruleLst>
-        </dgm:layoutNode>
-      </dgm:layoutNode>
-      <dgm:forEach name="Name9" axis="followSib" ptType="sibTrans" cnt="1">
-        <dgm:layoutNode name="sibTrans">
-          <dgm:alg type="sp"/>
-          <dgm:shape xmlns:r="http://schemas.openxmlformats.org/officeDocument/2006/relationships" r:blip="">
-            <dgm:adjLst/>
-          </dgm:shape>
-          <dgm:presOf axis="self"/>
-          <dgm:constrLst/>
-          <dgm:ruleLst/>
-        </dgm:layoutNode>
-      </dgm:forEach>
-    </dgm:forEach>
-  </dgm:layoutNode>
-  <dgm:extLst>
-    <a:ext uri="{68A01E43-0DF5-4B5B-8FA6-DAF915123BFB}">
-      <dgm1612:lstStyle xmlns:dgm1612="http://schemas.microsoft.com/office/drawing/2016/12/diagram">
-        <a:lvl1pPr>
-          <a:lnSpc>
-            <a:spcPct val="100000"/>
-          </a:lnSpc>
-          <a:defRPr cap="all"/>
-        </a:lvl1pPr>
-      </dgm1612:lstStyle>
-    </a:ext>
-  </dgm:extLst>
-</dgm:layoutDef>
-</file>
-
-<file path=ppt/diagrams/quickStyle1.xml><?xml version="1.0" encoding="utf-8"?>
-<dgm:styleDef xmlns:dgm="http://schemas.openxmlformats.org/drawingml/2006/diagram" xmlns:a="http://schemas.openxmlformats.org/drawingml/2006/main" uniqueId="urn:microsoft.com/office/officeart/2005/8/quickstyle/simple1">
-  <dgm:title val=""/>
-  <dgm:desc val=""/>
-  <dgm:catLst>
-    <dgm:cat type="simple" pri="10100"/>
-  </dgm:catLst>
-  <dgm:scene3d>
-    <a:camera prst="orthographicFront"/>
-    <a:lightRig rig="threePt" dir="t"/>
-  </dgm:scene3d>
-  <dgm:styleLbl name="node0">
-    <dgm:scene3d>
-      <a:camera prst="orthographicFront"/>
-      <a:lightRig rig="threePt" dir="t"/>
-    </dgm:scene3d>
-    <dgm:sp3d/>
-    <dgm:txPr/>
-    <dgm:style>
-      <a:lnRef idx="2">
-        <a:scrgbClr r="0" g="0" b="0"/>
-      </a:lnRef>
-      <a:fillRef idx="1">
-        <a:scrgbClr r="0" g="0" b="0"/>
-      </a:fillRef>
-      <a:effectRef idx="0">
-        <a:scrgbClr r="0" g="0" b="0"/>
-      </a:effectRef>
-      <a:fontRef idx="minor">
-        <a:schemeClr val="lt1"/>
-      </a:fontRef>
-    </dgm:style>
-  </dgm:styleLbl>
-  <dgm:styleLbl name="lnNode1">
-    <dgm:scene3d>
-      <a:camera prst="orthographicFront"/>
-      <a:lightRig rig="threePt" dir="t"/>
-    </dgm:scene3d>
-    <dgm:sp3d/>
-    <dgm:txPr/>
-    <dgm:style>
-      <a:lnRef idx="2">
-        <a:scrgbClr r="0" g="0" b="0"/>
-      </a:lnRef>
-      <a:fillRef idx="1">
-        <a:scrgbClr r="0" g="0" b="0"/>
-      </a:fillRef>
-      <a:effectRef idx="0">
-        <a:scrgbClr r="0" g="0" b="0"/>
-      </a:effectRef>
-      <a:fontRef idx="minor">
-        <a:schemeClr val="lt1"/>
-      </a:fontRef>
-    </dgm:style>
-  </dgm:styleLbl>
-  <dgm:styleLbl name="vennNode1">
-    <dgm:scene3d>
-      <a:camera prst="orthographicFront"/>
-      <a:lightRig rig="threePt" dir="t"/>
-    </dgm:scene3d>
-    <dgm:sp3d/>
-    <dgm:txPr/>
-    <dgm:style>
-      <a:lnRef idx="2">
-        <a:scrgbClr r="0" g="0" b="0"/>
-      </a:lnRef>
-      <a:fillRef idx="1">
-        <a:scrgbClr r="0" g="0" b="0"/>
-      </a:fillRef>
-      <a:effectRef idx="0">
-        <a:scrgbClr r="0" g="0" b="0"/>
-      </a:effectRef>
-      <a:fontRef idx="minor">
-        <a:schemeClr val="tx1"/>
-      </a:fontRef>
-    </dgm:style>
-  </dgm:styleLbl>
-  <dgm:styleLbl name="alignNode1">
-    <dgm:scene3d>
-      <a:camera prst="orthographicFront"/>
-      <a:lightRig rig="threePt" dir="t"/>
-    </dgm:scene3d>
-    <dgm:sp3d/>
-    <dgm:txPr/>
-    <dgm:style>
-      <a:lnRef idx="2">
-        <a:scrgbClr r="0" g="0" b="0"/>
-      </a:lnRef>
-      <a:fillRef idx="1">
-        <a:scrgbClr r="0" g="0" b="0"/>
-      </a:fillRef>
-      <a:effectRef idx="0">
-        <a:scrgbClr r="0" g="0" b="0"/>
-      </a:effectRef>
-      <a:fontRef idx="minor">
-        <a:schemeClr val="lt1"/>
-      </a:fontRef>
-    </dgm:style>
-  </dgm:styleLbl>
-  <dgm:styleLbl name="node1">
-    <dgm:scene3d>
-      <a:camera prst="orthographicFront"/>
-      <a:lightRig rig="threePt" dir="t"/>
-    </dgm:scene3d>
-    <dgm:sp3d/>
-    <dgm:txPr/>
-    <dgm:style>
-      <a:lnRef idx="2">
-        <a:scrgbClr r="0" g="0" b="0"/>
-      </a:lnRef>
-      <a:fillRef idx="1">
-        <a:scrgbClr r="0" g="0" b="0"/>
-      </a:fillRef>
-      <a:effectRef idx="0">
-        <a:scrgbClr r="0" g="0" b="0"/>
-      </a:effectRef>
-      <a:fontRef idx="minor">
-        <a:schemeClr val="lt1"/>
-      </a:fontRef>
-    </dgm:style>
-  </dgm:styleLbl>
-  <dgm:styleLbl name="node2">
-    <dgm:scene3d>
-      <a:camera prst="orthographicFront"/>
-      <a:lightRig rig="threePt" dir="t"/>
-    </dgm:scene3d>
-    <dgm:sp3d/>
-    <dgm:txPr/>
-    <dgm:style>
-      <a:lnRef idx="2">
-        <a:scrgbClr r="0" g="0" b="0"/>
-      </a:lnRef>
-      <a:fillRef idx="1">
-        <a:scrgbClr r="0" g="0" b="0"/>
-      </a:fillRef>
-      <a:effectRef idx="0">
-        <a:scrgbClr r="0" g="0" b="0"/>
-      </a:effectRef>
-      <a:fontRef idx="minor">
-        <a:schemeClr val="lt1"/>
-      </a:fontRef>
-    </dgm:style>
-  </dgm:styleLbl>
-  <dgm:styleLbl name="node3">
-    <dgm:scene3d>
-      <a:camera prst="orthographicFront"/>
-      <a:lightRig rig="threePt" dir="t"/>
-    </dgm:scene3d>
-    <dgm:sp3d/>
-    <dgm:txPr/>
-    <dgm:style>
-      <a:lnRef idx="2">
-        <a:scrgbClr r="0" g="0" b="0"/>
-      </a:lnRef>
-      <a:fillRef idx="1">
-        <a:scrgbClr r="0" g="0" b="0"/>
-      </a:fillRef>
-      <a:effectRef idx="0">
-        <a:scrgbClr r="0" g="0" b="0"/>
-      </a:effectRef>
-      <a:fontRef idx="minor">
-        <a:schemeClr val="lt1"/>
-      </a:fontRef>
-    </dgm:style>
-  </dgm:styleLbl>
-  <dgm:styleLbl name="node4">
-    <dgm:scene3d>
-      <a:camera prst="orthographicFront"/>
-      <a:lightRig rig="threePt" dir="t"/>
-    </dgm:scene3d>
-    <dgm:sp3d/>
-    <dgm:txPr/>
-    <dgm:style>
-      <a:lnRef idx="2">
-        <a:scrgbClr r="0" g="0" b="0"/>
-      </a:lnRef>
-      <a:fillRef idx="1">
-        <a:scrgbClr r="0" g="0" b="0"/>
-      </a:fillRef>
-      <a:effectRef idx="0">
-        <a:scrgbClr r="0" g="0" b="0"/>
-      </a:effectRef>
-      <a:fontRef idx="minor">
-        <a:schemeClr val="lt1"/>
-      </a:fontRef>
-    </dgm:style>
-  </dgm:styleLbl>
-  <dgm:styleLbl name="fgImgPlace1">
-    <dgm:scene3d>
-      <a:camera prst="orthographicFront"/>
-      <a:lightRig rig="threePt" dir="t"/>
-    </dgm:scene3d>
-    <dgm:sp3d/>
-    <dgm:txPr/>
-    <dgm:style>
-      <a:lnRef idx="2">
-        <a:scrgbClr r="0" g="0" b="0"/>
-      </a:lnRef>
-      <a:fillRef idx="1">
-        <a:scrgbClr r="0" g="0" b="0"/>
-      </a:fillRef>
-      <a:effectRef idx="0">
-        <a:scrgbClr r="0" g="0" b="0"/>
-      </a:effectRef>
-      <a:fontRef idx="minor"/>
-    </dgm:style>
-  </dgm:styleLbl>
-  <dgm:styleLbl name="alignImgPlace1">
-    <dgm:scene3d>
-      <a:camera prst="orthographicFront"/>
-      <a:lightRig rig="threePt" dir="t"/>
-    </dgm:scene3d>
-    <dgm:sp3d/>
-    <dgm:txPr/>
-    <dgm:style>
-      <a:lnRef idx="2">
-        <a:scrgbClr r="0" g="0" b="0"/>
-      </a:lnRef>
-      <a:fillRef idx="1">
-        <a:scrgbClr r="0" g="0" b="0"/>
-      </a:fillRef>
-      <a:effectRef idx="0">
-        <a:scrgbClr r="0" g="0" b="0"/>
-      </a:effectRef>
-      <a:fontRef idx="minor"/>
-    </dgm:style>
-  </dgm:styleLbl>
-  <dgm:styleLbl name="bgImgPlace1">
-    <dgm:scene3d>
-      <a:camera prst="orthographicFront"/>
-      <a:lightRig rig="threePt" dir="t"/>
-    </dgm:scene3d>
-    <dgm:sp3d/>
-    <dgm:txPr/>
-    <dgm:style>
-      <a:lnRef idx="2">
-        <a:scrgbClr r="0" g="0" b="0"/>
-      </a:lnRef>
-      <a:fillRef idx="1">
-        <a:scrgbClr r="0" g="0" b="0"/>
-      </a:fillRef>
-      <a:effectRef idx="0">
-        <a:scrgbClr r="0" g="0" b="0"/>
-      </a:effectRef>
-      <a:fontRef idx="minor"/>
-    </dgm:style>
-  </dgm:styleLbl>
-  <dgm:styleLbl name="sibTrans2D1">
-    <dgm:scene3d>
-      <a:camera prst="orthographicFront"/>
-      <a:lightRig rig="threePt" dir="t"/>
-    </dgm:scene3d>
-    <dgm:sp3d/>
-    <dgm:txPr/>
-    <dgm:style>
-      <a:lnRef idx="0">
-        <a:scrgbClr r="0" g="0" b="0"/>
-      </a:lnRef>
-      <a:fillRef idx="1">
-        <a:scrgbClr r="0" g="0" b="0"/>
-      </a:fillRef>
-      <a:effectRef idx="0">
-        <a:scrgbClr r="0" g="0" b="0"/>
-      </a:effectRef>
-      <a:fontRef idx="minor">
-        <a:schemeClr val="lt1"/>
-      </a:fontRef>
-    </dgm:style>
-  </dgm:styleLbl>
-  <dgm:styleLbl name="fgSibTrans2D1">
-    <dgm:scene3d>
-      <a:camera prst="orthographicFront"/>
-      <a:lightRig rig="threePt" dir="t"/>
-    </dgm:scene3d>
-    <dgm:sp3d/>
-    <dgm:txPr/>
-    <dgm:style>
-      <a:lnRef idx="0">
-        <a:scrgbClr r="0" g="0" b="0"/>
-      </a:lnRef>
-      <a:fillRef idx="1">
-        <a:scrgbClr r="0" g="0" b="0"/>
-      </a:fillRef>
-      <a:effectRef idx="0">
-        <a:scrgbClr r="0" g="0" b="0"/>
-      </a:effectRef>
-      <a:fontRef idx="minor">
-        <a:schemeClr val="lt1"/>
-      </a:fontRef>
-    </dgm:style>
-  </dgm:styleLbl>
-  <dgm:styleLbl name="bgSibTrans2D1">
-    <dgm:scene3d>
-      <a:camera prst="orthographicFront"/>
-      <a:lightRig rig="threePt" dir="t"/>
-    </dgm:scene3d>
-    <dgm:sp3d/>
-    <dgm:txPr/>
-    <dgm:style>
-      <a:lnRef idx="0">
-        <a:scrgbClr r="0" g="0" b="0"/>
-      </a:lnRef>
-      <a:fillRef idx="1">
-        <a:scrgbClr r="0" g="0" b="0"/>
-      </a:fillRef>
-      <a:effectRef idx="0">
-        <a:scrgbClr r="0" g="0" b="0"/>
-      </a:effectRef>
-      <a:fontRef idx="minor">
-        <a:schemeClr val="lt1"/>
-      </a:fontRef>
-    </dgm:style>
-  </dgm:styleLbl>
-  <dgm:styleLbl name="sibTrans1D1">
-    <dgm:scene3d>
-      <a:camera prst="orthographicFront"/>
-      <a:lightRig rig="threePt" dir="t"/>
-    </dgm:scene3d>
-    <dgm:sp3d/>
-    <dgm:txPr/>
-    <dgm:style>
-      <a:lnRef idx="1">
-        <a:scrgbClr r="0" g="0" b="0"/>
-      </a:lnRef>
-      <a:fillRef idx="0">
-        <a:scrgbClr r="0" g="0" b="0"/>
-      </a:fillRef>
-      <a:effectRef idx="0">
-        <a:scrgbClr r="0" g="0" b="0"/>
-      </a:effectRef>
-      <a:fontRef idx="minor"/>
-    </dgm:style>
-  </dgm:styleLbl>
-  <dgm:styleLbl name="callout">
-    <dgm:scene3d>
-      <a:camera prst="orthographicFront"/>
-      <a:lightRig rig="threePt" dir="t"/>
-    </dgm:scene3d>
-    <dgm:sp3d/>
-    <dgm:txPr/>
-    <dgm:style>
-      <a:lnRef idx="2">
-        <a:scrgbClr r="0" g="0" b="0"/>
-      </a:lnRef>
-      <a:fillRef idx="1">
-        <a:scrgbClr r="0" g="0" b="0"/>
-      </a:fillRef>
-      <a:effectRef idx="0">
-        <a:scrgbClr r="0" g="0" b="0"/>
-      </a:effectRef>
-      <a:fontRef idx="minor"/>
-    </dgm:style>
-  </dgm:styleLbl>
-  <dgm:styleLbl name="asst0">
-    <dgm:scene3d>
-      <a:camera prst="orthographicFront"/>
-      <a:lightRig rig="threePt" dir="t"/>
-    </dgm:scene3d>
-    <dgm:sp3d/>
-    <dgm:txPr/>
-    <dgm:style>
-      <a:lnRef idx="2">
-        <a:scrgbClr r="0" g="0" b="0"/>
-      </a:lnRef>
-      <a:fillRef idx="1">
-        <a:scrgbClr r="0" g="0" b="0"/>
-      </a:fillRef>
-      <a:effectRef idx="0">
-        <a:scrgbClr r="0" g="0" b="0"/>
-      </a:effectRef>
-      <a:fontRef idx="minor">
-        <a:schemeClr val="lt1"/>
-      </a:fontRef>
-    </dgm:style>
-  </dgm:styleLbl>
-  <dgm:styleLbl name="asst1">
-    <dgm:scene3d>
-      <a:camera prst="orthographicFront"/>
-      <a:lightRig rig="threePt" dir="t"/>
-    </dgm:scene3d>
-    <dgm:sp3d/>
-    <dgm:txPr/>
-    <dgm:style>
-      <a:lnRef idx="2">
-        <a:scrgbClr r="0" g="0" b="0"/>
-      </a:lnRef>
-      <a:fillRef idx="1">
-        <a:scrgbClr r="0" g="0" b="0"/>
-      </a:fillRef>
-      <a:effectRef idx="0">
-        <a:scrgbClr r="0" g="0" b="0"/>
-      </a:effectRef>
-      <a:fontRef idx="minor">
-        <a:schemeClr val="lt1"/>
-      </a:fontRef>
-    </dgm:style>
-  </dgm:styleLbl>
-  <dgm:styleLbl name="asst2">
-    <dgm:scene3d>
-      <a:camera prst="orthographicFront"/>
-      <a:lightRig rig="threePt" dir="t"/>
-    </dgm:scene3d>
-    <dgm:sp3d/>
-    <dgm:txPr/>
-    <dgm:style>
-      <a:lnRef idx="2">
-        <a:scrgbClr r="0" g="0" b="0"/>
-      </a:lnRef>
-      <a:fillRef idx="1">
-        <a:scrgbClr r="0" g="0" b="0"/>
-      </a:fillRef>
-      <a:effectRef idx="0">
-        <a:scrgbClr r="0" g="0" b="0"/>
-      </a:effectRef>
-      <a:fontRef idx="minor">
-        <a:schemeClr val="lt1"/>
-      </a:fontRef>
-    </dgm:style>
-  </dgm:styleLbl>
-  <dgm:styleLbl name="asst3">
-    <dgm:scene3d>
-      <a:camera prst="orthographicFront"/>
-      <a:lightRig rig="threePt" dir="t"/>
-    </dgm:scene3d>
-    <dgm:sp3d/>
-    <dgm:txPr/>
-    <dgm:style>
-      <a:lnRef idx="2">
-        <a:scrgbClr r="0" g="0" b="0"/>
-      </a:lnRef>
-      <a:fillRef idx="1">
-        <a:scrgbClr r="0" g="0" b="0"/>
-      </a:fillRef>
-      <a:effectRef idx="0">
-        <a:scrgbClr r="0" g="0" b="0"/>
-      </a:effectRef>
-      <a:fontRef idx="minor">
-        <a:schemeClr val="lt1"/>
-      </a:fontRef>
-    </dgm:style>
-  </dgm:styleLbl>
-  <dgm:styleLbl name="asst4">
-    <dgm:scene3d>
-      <a:camera prst="orthographicFront"/>
-      <a:lightRig rig="threePt" dir="t"/>
-    </dgm:scene3d>
-    <dgm:sp3d/>
-    <dgm:txPr/>
-    <dgm:style>
-      <a:lnRef idx="2">
-        <a:scrgbClr r="0" g="0" b="0"/>
-      </a:lnRef>
-      <a:fillRef idx="1">
-        <a:scrgbClr r="0" g="0" b="0"/>
-      </a:fillRef>
-      <a:effectRef idx="0">
-        <a:scrgbClr r="0" g="0" b="0"/>
-      </a:effectRef>
-      <a:fontRef idx="minor">
-        <a:schemeClr val="lt1"/>
-      </a:fontRef>
-    </dgm:style>
-  </dgm:styleLbl>
-  <dgm:styleLbl name="parChTrans2D1">
-    <dgm:scene3d>
-      <a:camera prst="orthographicFront"/>
-      <a:lightRig rig="threePt" dir="t"/>
-    </dgm:scene3d>
-    <dgm:sp3d/>
-    <dgm:txPr/>
-    <dgm:style>
-      <a:lnRef idx="2">
-        <a:scrgbClr r="0" g="0" b="0"/>
-      </a:lnRef>
-      <a:fillRef idx="1">
-        <a:scrgbClr r="0" g="0" b="0"/>
-      </a:fillRef>
-      <a:effectRef idx="0">
-        <a:scrgbClr r="0" g="0" b="0"/>
-      </a:effectRef>
-      <a:fontRef idx="minor">
-        <a:schemeClr val="lt1"/>
-      </a:fontRef>
-    </dgm:style>
-  </dgm:styleLbl>
-  <dgm:styleLbl name="parChTrans2D2">
-    <dgm:scene3d>
-      <a:camera prst="orthographicFront"/>
-      <a:lightRig rig="threePt" dir="t"/>
-    </dgm:scene3d>
-    <dgm:sp3d/>
-    <dgm:txPr/>
-    <dgm:style>
-      <a:lnRef idx="2">
-        <a:scrgbClr r="0" g="0" b="0"/>
-      </a:lnRef>
-      <a:fillRef idx="1">
-        <a:scrgbClr r="0" g="0" b="0"/>
-      </a:fillRef>
-      <a:effectRef idx="0">
-        <a:scrgbClr r="0" g="0" b="0"/>
-      </a:effectRef>
-      <a:fontRef idx="minor">
-        <a:schemeClr val="lt1"/>
-      </a:fontRef>
-    </dgm:style>
-  </dgm:styleLbl>
-  <dgm:styleLbl name="parChTrans2D3">
-    <dgm:scene3d>
-      <a:camera prst="orthographicFront"/>
-      <a:lightRig rig="threePt" dir="t"/>
-    </dgm:scene3d>
-    <dgm:sp3d/>
-    <dgm:txPr/>
-    <dgm:style>
-      <a:lnRef idx="2">
-        <a:scrgbClr r="0" g="0" b="0"/>
-      </a:lnRef>
-      <a:fillRef idx="1">
-        <a:scrgbClr r="0" g="0" b="0"/>
-      </a:fillRef>
-      <a:effectRef idx="0">
-        <a:scrgbClr r="0" g="0" b="0"/>
-      </a:effectRef>
-      <a:fontRef idx="minor">
-        <a:schemeClr val="lt1"/>
-      </a:fontRef>
-    </dgm:style>
-  </dgm:styleLbl>
-  <dgm:styleLbl name="parChTrans2D4">
-    <dgm:scene3d>
-      <a:camera prst="orthographicFront"/>
-      <a:lightRig rig="threePt" dir="t"/>
-    </dgm:scene3d>
-    <dgm:sp3d/>
-    <dgm:txPr/>
-    <dgm:style>
-      <a:lnRef idx="2">
-        <a:scrgbClr r="0" g="0" b="0"/>
-      </a:lnRef>
-      <a:fillRef idx="1">
-        <a:scrgbClr r="0" g="0" b="0"/>
-      </a:fillRef>
-      <a:effectRef idx="0">
-        <a:scrgbClr r="0" g="0" b="0"/>
-      </a:effectRef>
-      <a:fontRef idx="minor">
-        <a:schemeClr val="lt1"/>
-      </a:fontRef>
-    </dgm:style>
-  </dgm:styleLbl>
-  <dgm:styleLbl name="parChTrans1D1">
-    <dgm:scene3d>
-      <a:camera prst="orthographicFront"/>
-      <a:lightRig rig="threePt" dir="t"/>
-    </dgm:scene3d>
-    <dgm:sp3d/>
-    <dgm:txPr/>
-    <dgm:style>
-      <a:lnRef idx="2">
-        <a:scrgbClr r="0" g="0" b="0"/>
-      </a:lnRef>
-      <a:fillRef idx="0">
-        <a:scrgbClr r="0" g="0" b="0"/>
-      </a:fillRef>
-      <a:effectRef idx="0">
-        <a:scrgbClr r="0" g="0" b="0"/>
-      </a:effectRef>
-      <a:fontRef idx="minor"/>
-    </dgm:style>
-  </dgm:styleLbl>
-  <dgm:styleLbl name="parChTrans1D2">
-    <dgm:scene3d>
-      <a:camera prst="orthographicFront"/>
-      <a:lightRig rig="threePt" dir="t"/>
-    </dgm:scene3d>
-    <dgm:sp3d/>
-    <dgm:txPr/>
-    <dgm:style>
-      <a:lnRef idx="2">
-        <a:scrgbClr r="0" g="0" b="0"/>
-      </a:lnRef>
-      <a:fillRef idx="0">
-        <a:scrgbClr r="0" g="0" b="0"/>
-      </a:fillRef>
-      <a:effectRef idx="0">
-        <a:scrgbClr r="0" g="0" b="0"/>
-      </a:effectRef>
-      <a:fontRef idx="minor"/>
-    </dgm:style>
-  </dgm:styleLbl>
-  <dgm:styleLbl name="parChTrans1D3">
-    <dgm:scene3d>
-      <a:camera prst="orthographicFront"/>
-      <a:lightRig rig="threePt" dir="t"/>
-    </dgm:scene3d>
-    <dgm:sp3d/>
-    <dgm:txPr/>
-    <dgm:style>
-      <a:lnRef idx="2">
-        <a:scrgbClr r="0" g="0" b="0"/>
-      </a:lnRef>
-      <a:fillRef idx="0">
-        <a:scrgbClr r="0" g="0" b="0"/>
-      </a:fillRef>
-      <a:effectRef idx="0">
-        <a:scrgbClr r="0" g="0" b="0"/>
-      </a:effectRef>
-      <a:fontRef idx="minor"/>
-    </dgm:style>
-  </dgm:styleLbl>
-  <dgm:styleLbl name="parChTrans1D4">
-    <dgm:scene3d>
-      <a:camera prst="orthographicFront"/>
-      <a:lightRig rig="threePt" dir="t"/>
-    </dgm:scene3d>
-    <dgm:sp3d/>
-    <dgm:txPr/>
-    <dgm:style>
-      <a:lnRef idx="2">
-        <a:scrgbClr r="0" g="0" b="0"/>
-      </a:lnRef>
-      <a:fillRef idx="0">
-        <a:scrgbClr r="0" g="0" b="0"/>
-      </a:fillRef>
-      <a:effectRef idx="0">
-        <a:scrgbClr r="0" g="0" b="0"/>
-      </a:effectRef>
-      <a:fontRef idx="minor"/>
-    </dgm:style>
-  </dgm:styleLbl>
-  <dgm:styleLbl name="fgAcc1">
-    <dgm:scene3d>
-      <a:camera prst="orthographicFront"/>
-      <a:lightRig rig="threePt" dir="t"/>
-    </dgm:scene3d>
-    <dgm:sp3d/>
-    <dgm:txPr/>
-    <dgm:style>
-      <a:lnRef idx="2">
-        <a:scrgbClr r="0" g="0" b="0"/>
-      </a:lnRef>
-      <a:fillRef idx="1">
-        <a:scrgbClr r="0" g="0" b="0"/>
-      </a:fillRef>
-      <a:effectRef idx="0">
-        <a:scrgbClr r="0" g="0" b="0"/>
-      </a:effectRef>
-      <a:fontRef idx="minor"/>
-    </dgm:style>
-  </dgm:styleLbl>
-  <dgm:styleLbl name="conFgAcc1">
-    <dgm:scene3d>
-      <a:camera prst="orthographicFront"/>
-      <a:lightRig rig="threePt" dir="t"/>
-    </dgm:scene3d>
-    <dgm:sp3d/>
-    <dgm:txPr/>
-    <dgm:style>
-      <a:lnRef idx="2">
-        <a:scrgbClr r="0" g="0" b="0"/>
-      </a:lnRef>
-      <a:fillRef idx="1">
-        <a:scrgbClr r="0" g="0" b="0"/>
-      </a:fillRef>
-      <a:effectRef idx="0">
-        <a:scrgbClr r="0" g="0" b="0"/>
-      </a:effectRef>
-      <a:fontRef idx="minor"/>
-    </dgm:style>
-  </dgm:styleLbl>
-  <dgm:styleLbl name="alignAcc1">
-    <dgm:scene3d>
-      <a:camera prst="orthographicFront"/>
-      <a:lightRig rig="threePt" dir="t"/>
-    </dgm:scene3d>
-    <dgm:sp3d/>
-    <dgm:txPr/>
-    <dgm:style>
-      <a:lnRef idx="2">
-        <a:scrgbClr r="0" g="0" b="0"/>
-      </a:lnRef>
-      <a:fillRef idx="1">
-        <a:scrgbClr r="0" g="0" b="0"/>
-      </a:fillRef>
-      <a:effectRef idx="0">
-        <a:scrgbClr r="0" g="0" b="0"/>
-      </a:effectRef>
-      <a:fontRef idx="minor"/>
-    </dgm:style>
-  </dgm:styleLbl>
-  <dgm:styleLbl name="trAlignAcc1">
-    <dgm:scene3d>
-      <a:camera prst="orthographicFront"/>
-      <a:lightRig rig="threePt" dir="t"/>
-    </dgm:scene3d>
-    <dgm:sp3d/>
-    <dgm:txPr/>
-    <dgm:style>
-      <a:lnRef idx="1">
-        <a:scrgbClr r="0" g="0" b="0"/>
-      </a:lnRef>
-      <a:fillRef idx="1">
-        <a:scrgbClr r="0" g="0" b="0"/>
-      </a:fillRef>
-      <a:effectRef idx="0">
-        <a:scrgbClr r="0" g="0" b="0"/>
-      </a:effectRef>
-      <a:fontRef idx="minor"/>
-    </dgm:style>
-  </dgm:styleLbl>
-  <dgm:styleLbl name="bgAcc1">
-    <dgm:scene3d>
-      <a:camera prst="orthographicFront"/>
-      <a:lightRig rig="threePt" dir="t"/>
-    </dgm:scene3d>
-    <dgm:sp3d/>
-    <dgm:txPr/>
-    <dgm:style>
-      <a:lnRef idx="2">
-        <a:scrgbClr r="0" g="0" b="0"/>
-      </a:lnRef>
-      <a:fillRef idx="1">
-        <a:scrgbClr r="0" g="0" b="0"/>
-      </a:fillRef>
-      <a:effectRef idx="0">
-        <a:scrgbClr r="0" g="0" b="0"/>
-      </a:effectRef>
-      <a:fontRef idx="minor"/>
-    </dgm:style>
-  </dgm:styleLbl>
-  <dgm:styleLbl name="solidFgAcc1">
-    <dgm:scene3d>
-      <a:camera prst="orthographicFront"/>
-      <a:lightRig rig="threePt" dir="t"/>
-    </dgm:scene3d>
-    <dgm:sp3d/>
-    <dgm:txPr/>
-    <dgm:style>
-      <a:lnRef idx="2">
-        <a:scrgbClr r="0" g="0" b="0"/>
-      </a:lnRef>
-      <a:fillRef idx="1">
-        <a:scrgbClr r="0" g="0" b="0"/>
-      </a:fillRef>
-      <a:effectRef idx="0">
-        <a:scrgbClr r="0" g="0" b="0"/>
-      </a:effectRef>
-      <a:fontRef idx="minor"/>
-    </dgm:style>
-  </dgm:styleLbl>
-  <dgm:styleLbl name="solidAlignAcc1">
-    <dgm:scene3d>
-      <a:camera prst="orthographicFront"/>
-      <a:lightRig rig="threePt" dir="t"/>
-    </dgm:scene3d>
-    <dgm:sp3d/>
-    <dgm:txPr/>
-    <dgm:style>
-      <a:lnRef idx="2">
-        <a:scrgbClr r="0" g="0" b="0"/>
-      </a:lnRef>
-      <a:fillRef idx="1">
-        <a:scrgbClr r="0" g="0" b="0"/>
-      </a:fillRef>
-      <a:effectRef idx="0">
-        <a:scrgbClr r="0" g="0" b="0"/>
-      </a:effectRef>
-      <a:fontRef idx="minor"/>
-    </dgm:style>
-  </dgm:styleLbl>
-  <dgm:styleLbl name="solidBgAcc1">
-    <dgm:scene3d>
-      <a:camera prst="orthographicFront"/>
-      <a:lightRig rig="threePt" dir="t"/>
-    </dgm:scene3d>
-    <dgm:sp3d/>
-    <dgm:txPr/>
-    <dgm:style>
-      <a:lnRef idx="2">
-        <a:scrgbClr r="0" g="0" b="0"/>
-      </a:lnRef>
-      <a:fillRef idx="1">
-        <a:scrgbClr r="0" g="0" b="0"/>
-      </a:fillRef>
-      <a:effectRef idx="0">
-        <a:scrgbClr r="0" g="0" b="0"/>
-      </a:effectRef>
-      <a:fontRef idx="minor"/>
-    </dgm:style>
-  </dgm:styleLbl>
-  <dgm:styleLbl name="fgAccFollowNode1">
-    <dgm:scene3d>
-      <a:camera prst="orthographicFront"/>
-      <a:lightRig rig="threePt" dir="t"/>
-    </dgm:scene3d>
-    <dgm:sp3d/>
-    <dgm:txPr/>
-    <dgm:style>
-      <a:lnRef idx="2">
-        <a:scrgbClr r="0" g="0" b="0"/>
-      </a:lnRef>
-      <a:fillRef idx="1">
-        <a:scrgbClr r="0" g="0" b="0"/>
-      </a:fillRef>
-      <a:effectRef idx="0">
-        <a:scrgbClr r="0" g="0" b="0"/>
-      </a:effectRef>
-      <a:fontRef idx="minor"/>
-    </dgm:style>
-  </dgm:styleLbl>
-  <dgm:styleLbl name="alignAccFollowNode1">
-    <dgm:scene3d>
-      <a:camera prst="orthographicFront"/>
-      <a:lightRig rig="threePt" dir="t"/>
-    </dgm:scene3d>
-    <dgm:sp3d/>
-    <dgm:txPr/>
-    <dgm:style>
-      <a:lnRef idx="2">
-        <a:scrgbClr r="0" g="0" b="0"/>
-      </a:lnRef>
-      <a:fillRef idx="1">
-        <a:scrgbClr r="0" g="0" b="0"/>
-      </a:fillRef>
-      <a:effectRef idx="0">
-        <a:scrgbClr r="0" g="0" b="0"/>
-      </a:effectRef>
-      <a:fontRef idx="minor"/>
-    </dgm:style>
-  </dgm:styleLbl>
-  <dgm:styleLbl name="bgAccFollowNode1">
-    <dgm:scene3d>
-      <a:camera prst="orthographicFront"/>
-      <a:lightRig rig="threePt" dir="t"/>
-    </dgm:scene3d>
-    <dgm:sp3d/>
-    <dgm:txPr/>
-    <dgm:style>
-      <a:lnRef idx="2">
-        <a:scrgbClr r="0" g="0" b="0"/>
-      </a:lnRef>
-      <a:fillRef idx="1">
-        <a:scrgbClr r="0" g="0" b="0"/>
-      </a:fillRef>
-      <a:effectRef idx="0">
-        <a:scrgbClr r="0" g="0" b="0"/>
-      </a:effectRef>
-      <a:fontRef idx="minor"/>
-    </dgm:style>
-  </dgm:styleLbl>
-  <dgm:styleLbl name="fgAcc0">
-    <dgm:scene3d>
-      <a:camera prst="orthographicFront"/>
-      <a:lightRig rig="threePt" dir="t"/>
-    </dgm:scene3d>
-    <dgm:sp3d/>
-    <dgm:txPr/>
-    <dgm:style>
-      <a:lnRef idx="2">
-        <a:scrgbClr r="0" g="0" b="0"/>
-      </a:lnRef>
-      <a:fillRef idx="1">
-        <a:scrgbClr r="0" g="0" b="0"/>
-      </a:fillRef>
-      <a:effectRef idx="0">
-        <a:scrgbClr r="0" g="0" b="0"/>
-      </a:effectRef>
-      <a:fontRef idx="minor"/>
-    </dgm:style>
-  </dgm:styleLbl>
-  <dgm:styleLbl name="fgAcc2">
-    <dgm:scene3d>
-      <a:camera prst="orthographicFront"/>
-      <a:lightRig rig="threePt" dir="t"/>
-    </dgm:scene3d>
-    <dgm:sp3d/>
-    <dgm:txPr/>
-    <dgm:style>
-      <a:lnRef idx="2">
-        <a:scrgbClr r="0" g="0" b="0"/>
-      </a:lnRef>
-      <a:fillRef idx="1">
-        <a:scrgbClr r="0" g="0" b="0"/>
-      </a:fillRef>
-      <a:effectRef idx="0">
-        <a:scrgbClr r="0" g="0" b="0"/>
-      </a:effectRef>
-      <a:fontRef idx="minor"/>
-    </dgm:style>
-  </dgm:styleLbl>
-  <dgm:styleLbl name="fgAcc3">
-    <dgm:scene3d>
-      <a:camera prst="orthographicFront"/>
-      <a:lightRig rig="threePt" dir="t"/>
-    </dgm:scene3d>
-    <dgm:sp3d/>
-    <dgm:txPr/>
-    <dgm:style>
-      <a:lnRef idx="2">
-        <a:scrgbClr r="0" g="0" b="0"/>
-      </a:lnRef>
-      <a:fillRef idx="1">
-        <a:scrgbClr r="0" g="0" b="0"/>
-      </a:fillRef>
-      <a:effectRef idx="0">
-        <a:scrgbClr r="0" g="0" b="0"/>
-      </a:effectRef>
-      <a:fontRef idx="minor"/>
-    </dgm:style>
-  </dgm:styleLbl>
-  <dgm:styleLbl name="fgAcc4">
-    <dgm:scene3d>
-      <a:camera prst="orthographicFront"/>
-      <a:lightRig rig="threePt" dir="t"/>
-    </dgm:scene3d>
-    <dgm:sp3d/>
-    <dgm:txPr/>
-    <dgm:style>
-      <a:lnRef idx="2">
-        <a:scrgbClr r="0" g="0" b="0"/>
-      </a:lnRef>
-      <a:fillRef idx="1">
-        <a:scrgbClr r="0" g="0" b="0"/>
-      </a:fillRef>
-      <a:effectRef idx="0">
-        <a:scrgbClr r="0" g="0" b="0"/>
-      </a:effectRef>
-      <a:fontRef idx="minor"/>
-    </dgm:style>
-  </dgm:styleLbl>
-  <dgm:styleLbl name="bgShp">
-    <dgm:scene3d>
-      <a:camera prst="orthographicFront"/>
-      <a:lightRig rig="threePt" dir="t"/>
-    </dgm:scene3d>
-    <dgm:sp3d/>
-    <dgm:txPr/>
-    <dgm:style>
-      <a:lnRef idx="0">
-        <a:scrgbClr r="0" g="0" b="0"/>
-      </a:lnRef>
-      <a:fillRef idx="1">
-        <a:scrgbClr r="0" g="0" b="0"/>
-      </a:fillRef>
-      <a:effectRef idx="0">
-        <a:scrgbClr r="0" g="0" b="0"/>
-      </a:effectRef>
-      <a:fontRef idx="minor"/>
-    </dgm:style>
-  </dgm:styleLbl>
-  <dgm:styleLbl name="dkBgShp">
-    <dgm:scene3d>
-      <a:camera prst="orthographicFront"/>
-      <a:lightRig rig="threePt" dir="t"/>
-    </dgm:scene3d>
-    <dgm:sp3d/>
-    <dgm:txPr/>
-    <dgm:style>
-      <a:lnRef idx="0">
-        <a:scrgbClr r="0" g="0" b="0"/>
-      </a:lnRef>
-      <a:fillRef idx="1">
-        <a:scrgbClr r="0" g="0" b="0"/>
-      </a:fillRef>
-      <a:effectRef idx="0">
-        <a:scrgbClr r="0" g="0" b="0"/>
-      </a:effectRef>
-      <a:fontRef idx="minor"/>
-    </dgm:style>
-  </dgm:styleLbl>
-  <dgm:styleLbl name="trBgShp">
-    <dgm:scene3d>
-      <a:camera prst="orthographicFront"/>
-      <a:lightRig rig="threePt" dir="t"/>
-    </dgm:scene3d>
-    <dgm:sp3d/>
-    <dgm:txPr/>
-    <dgm:style>
-      <a:lnRef idx="0">
-        <a:scrgbClr r="0" g="0" b="0"/>
-      </a:lnRef>
-      <a:fillRef idx="1">
-        <a:scrgbClr r="0" g="0" b="0"/>
-      </a:fillRef>
-      <a:effectRef idx="0">
-        <a:scrgbClr r="0" g="0" b="0"/>
-      </a:effectRef>
-      <a:fontRef idx="minor"/>
-    </dgm:style>
-  </dgm:styleLbl>
-  <dgm:styleLbl name="fgShp">
-    <dgm:scene3d>
-      <a:camera prst="orthographicFront"/>
-      <a:lightRig rig="threePt" dir="t"/>
-    </dgm:scene3d>
-    <dgm:sp3d/>
-    <dgm:txPr/>
-    <dgm:style>
-      <a:lnRef idx="2">
-        <a:scrgbClr r="0" g="0" b="0"/>
-      </a:lnRef>
-      <a:fillRef idx="1">
-        <a:scrgbClr r="0" g="0" b="0"/>
-      </a:fillRef>
-      <a:effectRef idx="0">
-        <a:scrgbClr r="0" g="0" b="0"/>
-      </a:effectRef>
-      <a:fontRef idx="minor"/>
-    </dgm:style>
-  </dgm:styleLbl>
-  <dgm:styleLbl name="revTx">
-    <dgm:scene3d>
-      <a:camera prst="orthographicFront"/>
-      <a:lightRig rig="threePt" dir="t"/>
-    </dgm:scene3d>
-    <dgm:sp3d/>
-    <dgm:txPr/>
-    <dgm:style>
-      <a:lnRef idx="0">
-        <a:scrgbClr r="0" g="0" b="0"/>
-      </a:lnRef>
-      <a:fillRef idx="0">
-        <a:scrgbClr r="0" g="0" b="0"/>
-      </a:fillRef>
-      <a:effectRef idx="0">
-        <a:scrgbClr r="0" g="0" b="0"/>
-      </a:effectRef>
-      <a:fontRef idx="minor"/>
-    </dgm:style>
-  </dgm:styleLbl>
-</dgm:styleDef>
-</file>
-
 <file path=ppt/notesMasters/notesMaster1.xml><?xml version="1.0" encoding="utf-8"?>
 <p:notesMaster xmlns:a="http://schemas.openxmlformats.org/drawingml/2006/main" xmlns:r="http://schemas.openxmlformats.org/officeDocument/2006/relationships" xmlns:p="http://schemas.openxmlformats.org/presentationml/2006/main">
   <p:cSld>
@@ -3252,150 +462,6 @@
     </a:lvl9pPr>
   </p:notesStyle>
 </p:notesMaster>
-</file>
-
-<file path=ppt/notesSlides/notesSlide1.xml><?xml version="1.0" encoding="utf-8"?>
-<p:notes xmlns:a="http://schemas.openxmlformats.org/drawingml/2006/main" xmlns:r="http://schemas.openxmlformats.org/officeDocument/2006/relationships" xmlns:p="http://schemas.openxmlformats.org/presentationml/2006/main">
-  <p:cSld>
-    <p:spTree>
-      <p:nvGrpSpPr>
-        <p:cNvPr id="1" name=""/>
-        <p:cNvGrpSpPr/>
-        <p:nvPr/>
-      </p:nvGrpSpPr>
-      <p:grpSpPr>
-        <a:xfrm>
-          <a:off x="0" y="0"/>
-          <a:ext cx="0" cy="0"/>
-          <a:chOff x="0" y="0"/>
-          <a:chExt cx="0" cy="0"/>
-        </a:xfrm>
-      </p:grpSpPr>
-      <p:sp>
-        <p:nvSpPr>
-          <p:cNvPr id="2" name="Slide Image Placeholder 1"/>
-          <p:cNvSpPr>
-            <a:spLocks noGrp="1" noRot="1" noChangeAspect="1"/>
-          </p:cNvSpPr>
-          <p:nvPr>
-            <p:ph type="sldImg"/>
-          </p:nvPr>
-        </p:nvSpPr>
-        <p:spPr/>
-      </p:sp>
-      <p:sp>
-        <p:nvSpPr>
-          <p:cNvPr id="3" name="Notes Placeholder 2"/>
-          <p:cNvSpPr>
-            <a:spLocks noGrp="1"/>
-          </p:cNvSpPr>
-          <p:nvPr>
-            <p:ph type="body" idx="1"/>
-          </p:nvPr>
-        </p:nvSpPr>
-        <p:spPr/>
-        <p:txBody>
-          <a:bodyPr/>
-          <a:lstStyle/>
-          <a:p>
-            <a:endParaRPr lang="en-US" dirty="0"/>
-          </a:p>
-        </p:txBody>
-      </p:sp>
-      <p:sp>
-        <p:nvSpPr>
-          <p:cNvPr id="4" name="Slide Number Placeholder 3"/>
-          <p:cNvSpPr>
-            <a:spLocks noGrp="1"/>
-          </p:cNvSpPr>
-          <p:nvPr>
-            <p:ph type="sldNum" sz="quarter" idx="5"/>
-          </p:nvPr>
-        </p:nvSpPr>
-        <p:spPr/>
-        <p:txBody>
-          <a:bodyPr/>
-          <a:lstStyle/>
-          <a:p>
-            <a:pPr marL="0" marR="0" lvl="0" indent="0" algn="r" defTabSz="914400" rtl="0" eaLnBrk="1" fontAlgn="auto" latinLnBrk="0" hangingPunct="1">
-              <a:lnSpc>
-                <a:spcPct val="100000"/>
-              </a:lnSpc>
-              <a:spcBef>
-                <a:spcPts val="0"/>
-              </a:spcBef>
-              <a:spcAft>
-                <a:spcPts val="0"/>
-              </a:spcAft>
-              <a:buClrTx/>
-              <a:buSzTx/>
-              <a:buFontTx/>
-              <a:buNone/>
-              <a:tabLst/>
-              <a:defRPr/>
-            </a:pPr>
-            <a:fld id="{33AEA074-24A7-4657-AE02-A51F68EA6AA2}" type="slidenum">
-              <a:rPr kumimoji="0" lang="en-US" sz="1200" b="0" i="0" u="none" strike="noStrike" kern="1200" cap="none" spc="0" normalizeH="0" baseline="0" noProof="0" smtClean="0">
-                <a:ln>
-                  <a:noFill/>
-                </a:ln>
-                <a:solidFill>
-                  <a:prstClr val="black"/>
-                </a:solidFill>
-                <a:effectLst/>
-                <a:uLnTx/>
-                <a:uFillTx/>
-                <a:latin typeface="Calibri" panose="020F0502020204030204"/>
-                <a:ea typeface="+mn-ea"/>
-                <a:cs typeface="+mn-cs"/>
-              </a:rPr>
-              <a:pPr marL="0" marR="0" lvl="0" indent="0" algn="r" defTabSz="914400" rtl="0" eaLnBrk="1" fontAlgn="auto" latinLnBrk="0" hangingPunct="1">
-                <a:lnSpc>
-                  <a:spcPct val="100000"/>
-                </a:lnSpc>
-                <a:spcBef>
-                  <a:spcPts val="0"/>
-                </a:spcBef>
-                <a:spcAft>
-                  <a:spcPts val="0"/>
-                </a:spcAft>
-                <a:buClrTx/>
-                <a:buSzTx/>
-                <a:buFontTx/>
-                <a:buNone/>
-                <a:tabLst/>
-                <a:defRPr/>
-              </a:pPr>
-              <a:t>2</a:t>
-            </a:fld>
-            <a:endParaRPr kumimoji="0" lang="en-US" sz="1200" b="0" i="0" u="none" strike="noStrike" kern="1200" cap="none" spc="0" normalizeH="0" baseline="0" noProof="0" dirty="0">
-              <a:ln>
-                <a:noFill/>
-              </a:ln>
-              <a:solidFill>
-                <a:prstClr val="black"/>
-              </a:solidFill>
-              <a:effectLst/>
-              <a:uLnTx/>
-              <a:uFillTx/>
-              <a:latin typeface="Calibri" panose="020F0502020204030204"/>
-              <a:ea typeface="+mn-ea"/>
-              <a:cs typeface="+mn-cs"/>
-            </a:endParaRPr>
-          </a:p>
-        </p:txBody>
-      </p:sp>
-    </p:spTree>
-    <p:extLst>
-      <p:ext uri="{BB962C8B-B14F-4D97-AF65-F5344CB8AC3E}">
-        <p14:creationId xmlns:p14="http://schemas.microsoft.com/office/powerpoint/2010/main" val="1841689649"/>
-      </p:ext>
-    </p:extLst>
-  </p:cSld>
-  <p:clrMapOvr>
-    <a:masterClrMapping/>
-  </p:clrMapOvr>
-</p:notes>
 </file>
 
 <file path=ppt/slideLayouts/slideLayout1.xml><?xml version="1.0" encoding="utf-8"?>
@@ -6562,7 +3628,7 @@
           <a:chExt cx="0" cy="0"/>
         </a:xfrm>
       </p:grpSpPr>
-      <p:sp useBgFill="1">
+      <p:sp>
         <p:nvSpPr>
           <p:cNvPr id="44" name="Rectangle 37">
             <a:extLst>
@@ -6639,7 +3705,10 @@
                 <a:noFill/>
               </a:ln>
               <a:solidFill>
-                <a:prstClr val="white"/>
+                <a:schemeClr val="bg1">
+                  <a:lumMod val="75000"/>
+                  <a:lumOff val="25000"/>
+                </a:schemeClr>
               </a:solidFill>
               <a:effectLst/>
               <a:uLnTx/>
@@ -6653,7 +3722,7 @@
       </p:sp>
       <p:pic>
         <p:nvPicPr>
-          <p:cNvPr id="8" name="Picture 7" descr="A dog looking at the camera">
+          <p:cNvPr id="8" name="Picture 7">
             <a:extLst>
               <a:ext uri="{FF2B5EF4-FFF2-40B4-BE49-F238E27FC236}">
                 <a16:creationId xmlns:a16="http://schemas.microsoft.com/office/drawing/2014/main" id="{F0B92F21-44D0-49F2-B59D-6723737D9B5C}"/>
@@ -6666,21 +3735,14 @@
           <p:nvPr/>
         </p:nvPicPr>
         <p:blipFill rotWithShape="1">
-          <a:blip r:embed="rId3">
-            <a:alphaModFix amt="40000"/>
-            <a:extLst>
-              <a:ext uri="{28A0092B-C50C-407E-A947-70E740481C1C}">
-                <a14:useLocalDpi xmlns:a14="http://schemas.microsoft.com/office/drawing/2010/main" val="0"/>
-              </a:ext>
-            </a:extLst>
-          </a:blip>
-          <a:srcRect/>
+          <a:blip r:embed="rId3"/>
+          <a:srcRect l="718" t="8526" r="-718" b="8527"/>
           <a:stretch/>
         </p:blipFill>
         <p:spPr>
           <a:xfrm>
-            <a:off x="20" y="10"/>
-            <a:ext cx="12191980" cy="6857990"/>
+            <a:off x="0" y="0"/>
+            <a:ext cx="12350093" cy="6868594"/>
           </a:xfrm>
           <a:prstGeom prst="rect">
             <a:avLst/>
@@ -6705,23 +3767,38 @@
         </p:nvSpPr>
         <p:spPr>
           <a:xfrm>
-            <a:off x="965201" y="1020431"/>
-            <a:ext cx="10225530" cy="1475013"/>
+            <a:off x="7736207" y="4068826"/>
+            <a:ext cx="4534839" cy="1080603"/>
           </a:xfrm>
         </p:spPr>
         <p:txBody>
           <a:bodyPr>
-            <a:normAutofit/>
+            <a:noAutofit/>
           </a:bodyPr>
           <a:lstStyle/>
           <a:p>
             <a:r>
-              <a:rPr lang="en-US" sz="4000" dirty="0">
+              <a:rPr lang="en-US" sz="4000" b="1" dirty="0">
                 <a:solidFill>
                   <a:schemeClr val="tx1"/>
                 </a:solidFill>
               </a:rPr>
-              <a:t>Title Lorem Ipsum</a:t>
+              <a:t>My assignment </a:t>
+            </a:r>
+            <a:br>
+              <a:rPr lang="en-US" sz="4000" b="1" dirty="0">
+                <a:solidFill>
+                  <a:schemeClr val="tx1"/>
+                </a:solidFill>
+              </a:rPr>
+            </a:br>
+            <a:r>
+              <a:rPr lang="en-US" sz="4000" b="1" dirty="0">
+                <a:solidFill>
+                  <a:schemeClr val="tx1"/>
+                </a:solidFill>
+              </a:rPr>
+              <a:t>presentation</a:t>
             </a:r>
           </a:p>
         </p:txBody>
@@ -6744,8 +3821,8 @@
         </p:nvSpPr>
         <p:spPr>
           <a:xfrm>
-            <a:off x="965200" y="2495445"/>
-            <a:ext cx="10225530" cy="590321"/>
+            <a:off x="7736207" y="5590737"/>
+            <a:ext cx="3759493" cy="1080602"/>
           </a:xfrm>
         </p:spPr>
         <p:txBody>
@@ -6755,13 +3832,148 @@
           <a:lstStyle/>
           <a:p>
             <a:r>
-              <a:rPr lang="en-US" sz="1600" dirty="0">
+              <a:rPr lang="en-US" sz="1600" b="1" dirty="0">
                 <a:solidFill>
-                  <a:schemeClr val="tx1"/>
+                  <a:schemeClr val="bg1">
+                    <a:lumMod val="95000"/>
+                    <a:lumOff val="5000"/>
+                  </a:schemeClr>
                 </a:solidFill>
+                <a:latin typeface="Arial (Heading)"/>
               </a:rPr>
-              <a:t>Sit Dolor Amet</a:t>
-            </a:r>
+              <a:t>Name  : </a:t>
+            </a:r>
+            <a:r>
+              <a:rPr lang="en-US" sz="1600" b="1" dirty="0" err="1">
+                <a:solidFill>
+                  <a:schemeClr val="bg1">
+                    <a:lumMod val="95000"/>
+                    <a:lumOff val="5000"/>
+                  </a:schemeClr>
+                </a:solidFill>
+                <a:latin typeface="Arial (Heading)"/>
+              </a:rPr>
+              <a:t>gefy</a:t>
+            </a:r>
+            <a:r>
+              <a:rPr lang="en-US" sz="1600" b="1" dirty="0">
+                <a:solidFill>
+                  <a:schemeClr val="bg1">
+                    <a:lumMod val="95000"/>
+                    <a:lumOff val="5000"/>
+                  </a:schemeClr>
+                </a:solidFill>
+                <a:latin typeface="Arial (Heading)"/>
+              </a:rPr>
+              <a:t> Aqiilah Aqshal</a:t>
+            </a:r>
+          </a:p>
+          <a:p>
+            <a:r>
+              <a:rPr lang="en-US" b="1" dirty="0">
+                <a:solidFill>
+                  <a:schemeClr val="bg1">
+                    <a:lumMod val="95000"/>
+                    <a:lumOff val="5000"/>
+                  </a:schemeClr>
+                </a:solidFill>
+                <a:latin typeface="Arial (Heading)"/>
+              </a:rPr>
+              <a:t>Class : </a:t>
+            </a:r>
+            <a:r>
+              <a:rPr lang="en-US" b="1" dirty="0" err="1">
+                <a:solidFill>
+                  <a:schemeClr val="bg1">
+                    <a:lumMod val="95000"/>
+                    <a:lumOff val="5000"/>
+                  </a:schemeClr>
+                </a:solidFill>
+                <a:latin typeface="Arial (Heading)"/>
+              </a:rPr>
+              <a:t>Fullstack</a:t>
+            </a:r>
+            <a:r>
+              <a:rPr lang="en-US" b="1" dirty="0">
+                <a:solidFill>
+                  <a:schemeClr val="bg1">
+                    <a:lumMod val="95000"/>
+                    <a:lumOff val="5000"/>
+                  </a:schemeClr>
+                </a:solidFill>
+                <a:latin typeface="Arial (Heading)"/>
+              </a:rPr>
+              <a:t> website - 5</a:t>
+            </a:r>
+            <a:endParaRPr lang="en-US" sz="1600" b="1" dirty="0">
+              <a:solidFill>
+                <a:schemeClr val="bg1">
+                  <a:lumMod val="95000"/>
+                  <a:lumOff val="5000"/>
+                </a:schemeClr>
+              </a:solidFill>
+              <a:latin typeface="Arial (Heading)"/>
+            </a:endParaRPr>
+          </a:p>
+          <a:p>
+            <a:endParaRPr lang="en-US" sz="1600" b="1" dirty="0">
+              <a:solidFill>
+                <a:schemeClr val="bg1">
+                  <a:lumMod val="95000"/>
+                  <a:lumOff val="5000"/>
+                </a:schemeClr>
+              </a:solidFill>
+              <a:latin typeface="Arial (Heading)"/>
+            </a:endParaRPr>
+          </a:p>
+        </p:txBody>
+      </p:sp>
+      <p:sp>
+        <p:nvSpPr>
+          <p:cNvPr id="4" name="Rectangle 3">
+            <a:extLst>
+              <a:ext uri="{FF2B5EF4-FFF2-40B4-BE49-F238E27FC236}">
+                <a16:creationId xmlns:a16="http://schemas.microsoft.com/office/drawing/2014/main" id="{73AB2C25-2386-41EC-A44A-34CC443B60B8}"/>
+              </a:ext>
+            </a:extLst>
+          </p:cNvPr>
+          <p:cNvSpPr/>
+          <p:nvPr/>
+        </p:nvSpPr>
+        <p:spPr>
+          <a:xfrm>
+            <a:off x="7899399" y="5143500"/>
+            <a:ext cx="3759493" cy="50800"/>
+          </a:xfrm>
+          <a:prstGeom prst="rect">
+            <a:avLst/>
+          </a:prstGeom>
+          <a:ln>
+            <a:solidFill>
+              <a:schemeClr val="tx1"/>
+            </a:solidFill>
+          </a:ln>
+        </p:spPr>
+        <p:style>
+          <a:lnRef idx="2">
+            <a:schemeClr val="accent6"/>
+          </a:lnRef>
+          <a:fillRef idx="1">
+            <a:schemeClr val="lt1"/>
+          </a:fillRef>
+          <a:effectRef idx="0">
+            <a:schemeClr val="accent6"/>
+          </a:effectRef>
+          <a:fontRef idx="minor">
+            <a:schemeClr val="dk1"/>
+          </a:fontRef>
+        </p:style>
+        <p:txBody>
+          <a:bodyPr rtlCol="0" anchor="ctr"/>
+          <a:lstStyle/>
+          <a:p>
+            <a:pPr algn="ctr"/>
+            <a:endParaRPr lang="en-ID"/>
           </a:p>
         </p:txBody>
       </p:sp>
@@ -6774,95 +3986,6 @@
   </p:cSld>
   <p:clrMapOvr>
     <a:overrideClrMapping bg1="dk1" tx1="lt1" bg2="dk2" tx2="lt2" accent1="accent1" accent2="accent2" accent3="accent3" accent4="accent4" accent5="accent5" accent6="accent6" hlink="hlink" folHlink="folHlink"/>
-  </p:clrMapOvr>
-</p:sld>
-</file>
-
-<file path=ppt/slides/slide2.xml><?xml version="1.0" encoding="utf-8"?>
-<p:sld xmlns:a="http://schemas.openxmlformats.org/drawingml/2006/main" xmlns:r="http://schemas.openxmlformats.org/officeDocument/2006/relationships" xmlns:p="http://schemas.openxmlformats.org/presentationml/2006/main">
-  <p:cSld>
-    <p:spTree>
-      <p:nvGrpSpPr>
-        <p:cNvPr id="1" name=""/>
-        <p:cNvGrpSpPr/>
-        <p:nvPr/>
-      </p:nvGrpSpPr>
-      <p:grpSpPr>
-        <a:xfrm>
-          <a:off x="0" y="0"/>
-          <a:ext cx="0" cy="0"/>
-          <a:chOff x="0" y="0"/>
-          <a:chExt cx="0" cy="0"/>
-        </a:xfrm>
-      </p:grpSpPr>
-      <p:sp>
-        <p:nvSpPr>
-          <p:cNvPr id="2" name="Title 1">
-            <a:extLst>
-              <a:ext uri="{FF2B5EF4-FFF2-40B4-BE49-F238E27FC236}">
-                <a16:creationId xmlns:a16="http://schemas.microsoft.com/office/drawing/2014/main" id="{E52D4D1E-BA60-4A23-8EBC-1159C82F9571}"/>
-              </a:ext>
-            </a:extLst>
-          </p:cNvPr>
-          <p:cNvSpPr>
-            <a:spLocks noGrp="1"/>
-          </p:cNvSpPr>
-          <p:nvPr>
-            <p:ph type="title"/>
-          </p:nvPr>
-        </p:nvSpPr>
-        <p:spPr/>
-        <p:txBody>
-          <a:bodyPr/>
-          <a:lstStyle/>
-          <a:p>
-            <a:r>
-              <a:rPr lang="en-US" dirty="0"/>
-              <a:t>Title Lorem Ipsum </a:t>
-            </a:r>
-          </a:p>
-        </p:txBody>
-      </p:sp>
-      <p:graphicFrame>
-        <p:nvGraphicFramePr>
-          <p:cNvPr id="5" name="Content Placeholder 2" descr="SmartArt graphic">
-            <a:extLst>
-              <a:ext uri="{FF2B5EF4-FFF2-40B4-BE49-F238E27FC236}">
-                <a16:creationId xmlns:a16="http://schemas.microsoft.com/office/drawing/2014/main" id="{65AA958D-239A-4E9F-9880-A6024BBB0D68}"/>
-              </a:ext>
-            </a:extLst>
-          </p:cNvPr>
-          <p:cNvGraphicFramePr>
-            <a:graphicFrameLocks noGrp="1"/>
-          </p:cNvGraphicFramePr>
-          <p:nvPr>
-            <p:ph idx="1"/>
-            <p:extLst>
-              <p:ext uri="{D42A27DB-BD31-4B8C-83A1-F6EECF244321}">
-                <p14:modId xmlns:p14="http://schemas.microsoft.com/office/powerpoint/2010/main" val="2008896124"/>
-              </p:ext>
-            </p:extLst>
-          </p:nvPr>
-        </p:nvGraphicFramePr>
-        <p:xfrm>
-          <a:off x="581025" y="2341563"/>
-          <a:ext cx="11029950" cy="3633787"/>
-        </p:xfrm>
-        <a:graphic>
-          <a:graphicData uri="http://schemas.openxmlformats.org/drawingml/2006/diagram">
-            <dgm:relIds xmlns:dgm="http://schemas.openxmlformats.org/drawingml/2006/diagram" xmlns:r="http://schemas.openxmlformats.org/officeDocument/2006/relationships" r:dm="rId4" r:lo="rId5" r:qs="rId6" r:cs="rId7"/>
-          </a:graphicData>
-        </a:graphic>
-      </p:graphicFrame>
-    </p:spTree>
-    <p:extLst>
-      <p:ext uri="{BB962C8B-B14F-4D97-AF65-F5344CB8AC3E}">
-        <p14:creationId xmlns:p14="http://schemas.microsoft.com/office/powerpoint/2010/main" val="2633271797"/>
-      </p:ext>
-    </p:extLst>
-  </p:cSld>
-  <p:clrMapOvr>
-    <a:masterClrMapping/>
   </p:clrMapOvr>
 </p:sld>
 </file>
@@ -7474,56 +4597,13 @@
 </a:themeOverride>
 </file>
 
-<file path=ppt/theme/themeOverride2.xml><?xml version="1.0" encoding="utf-8"?>
-<a:themeOverride xmlns:a="http://schemas.openxmlformats.org/drawingml/2006/main">
-  <a:clrScheme name="Green">
-    <a:dk1>
-      <a:sysClr val="windowText" lastClr="000000"/>
-    </a:dk1>
-    <a:lt1>
-      <a:sysClr val="window" lastClr="FFFFFF"/>
-    </a:lt1>
-    <a:dk2>
-      <a:srgbClr val="455F51"/>
-    </a:dk2>
-    <a:lt2>
-      <a:srgbClr val="E3DED1"/>
-    </a:lt2>
-    <a:accent1>
-      <a:srgbClr val="549E39"/>
-    </a:accent1>
-    <a:accent2>
-      <a:srgbClr val="8AB833"/>
-    </a:accent2>
-    <a:accent3>
-      <a:srgbClr val="C0CF3A"/>
-    </a:accent3>
-    <a:accent4>
-      <a:srgbClr val="029676"/>
-    </a:accent4>
-    <a:accent5>
-      <a:srgbClr val="4AB5C4"/>
-    </a:accent5>
-    <a:accent6>
-      <a:srgbClr val="0989B1"/>
-    </a:accent6>
-    <a:hlink>
-      <a:srgbClr val="6B9F25"/>
-    </a:hlink>
-    <a:folHlink>
-      <a:srgbClr val="BA6906"/>
-    </a:folHlink>
-  </a:clrScheme>
-</a:themeOverride>
-</file>
-
 <file path=customXml/item1.xml><?xml version="1.0" encoding="utf-8"?>
-<?mso-contentType ?>
-<FormTemplates xmlns="http://schemas.microsoft.com/sharepoint/v3/contenttype/forms">
-  <Display>DocumentLibraryForm</Display>
-  <Edit>DocumentLibraryForm</Edit>
-  <New>DocumentLibraryForm</New>
-</FormTemplates>
+<p:properties xmlns:p="http://schemas.microsoft.com/office/2006/metadata/properties" xmlns:xsi="http://www.w3.org/2001/XMLSchema-instance" xmlns:pc="http://schemas.microsoft.com/office/infopath/2007/PartnerControls">
+  <documentManagement>
+    <Status xmlns="71af3243-3dd4-4a8d-8c0d-dd76da1f02a5">Not started</Status>
+    <MediaServiceKeyPoints xmlns="71af3243-3dd4-4a8d-8c0d-dd76da1f02a5" xsi:nil="true"/>
+  </documentManagement>
+</p:properties>
 </file>
 
 <file path=customXml/item2.xml><?xml version="1.0" encoding="utf-8"?>
@@ -7748,18 +4828,20 @@
 </file>
 
 <file path=customXml/item3.xml><?xml version="1.0" encoding="utf-8"?>
-<p:properties xmlns:p="http://schemas.microsoft.com/office/2006/metadata/properties" xmlns:xsi="http://www.w3.org/2001/XMLSchema-instance" xmlns:pc="http://schemas.microsoft.com/office/infopath/2007/PartnerControls">
-  <documentManagement>
-    <Status xmlns="71af3243-3dd4-4a8d-8c0d-dd76da1f02a5">Not started</Status>
-    <MediaServiceKeyPoints xmlns="71af3243-3dd4-4a8d-8c0d-dd76da1f02a5" xsi:nil="true"/>
-  </documentManagement>
-</p:properties>
+<?mso-contentType ?>
+<FormTemplates xmlns="http://schemas.microsoft.com/sharepoint/v3/contenttype/forms">
+  <Display>DocumentLibraryForm</Display>
+  <Edit>DocumentLibraryForm</Edit>
+  <New>DocumentLibraryForm</New>
+</FormTemplates>
 </file>
 
 <file path=customXml/itemProps1.xml><?xml version="1.0" encoding="utf-8"?>
-<ds:datastoreItem xmlns:ds="http://schemas.openxmlformats.org/officeDocument/2006/customXml" ds:itemID="{B116C154-5A0F-4CDC-8C15-D2E21584649C}">
+<ds:datastoreItem xmlns:ds="http://schemas.openxmlformats.org/officeDocument/2006/customXml" ds:itemID="{3A6D3478-2986-4664-940C-67E0CAA21E04}">
   <ds:schemaRefs>
-    <ds:schemaRef ds:uri="http://schemas.microsoft.com/sharepoint/v3/contenttype/forms"/>
+    <ds:schemaRef ds:uri="http://schemas.microsoft.com/office/2006/metadata/properties"/>
+    <ds:schemaRef ds:uri="http://schemas.microsoft.com/office/infopath/2007/PartnerControls"/>
+    <ds:schemaRef ds:uri="71af3243-3dd4-4a8d-8c0d-dd76da1f02a5"/>
   </ds:schemaRefs>
 </ds:datastoreItem>
 </file>
@@ -7784,11 +4866,9 @@
 </file>
 
 <file path=customXml/itemProps3.xml><?xml version="1.0" encoding="utf-8"?>
-<ds:datastoreItem xmlns:ds="http://schemas.openxmlformats.org/officeDocument/2006/customXml" ds:itemID="{3A6D3478-2986-4664-940C-67E0CAA21E04}">
+<ds:datastoreItem xmlns:ds="http://schemas.openxmlformats.org/officeDocument/2006/customXml" ds:itemID="{B116C154-5A0F-4CDC-8C15-D2E21584649C}">
   <ds:schemaRefs>
-    <ds:schemaRef ds:uri="http://schemas.microsoft.com/office/2006/metadata/properties"/>
-    <ds:schemaRef ds:uri="http://schemas.microsoft.com/office/infopath/2007/PartnerControls"/>
-    <ds:schemaRef ds:uri="71af3243-3dd4-4a8d-8c0d-dd76da1f02a5"/>
+    <ds:schemaRef ds:uri="http://schemas.microsoft.com/sharepoint/v3/contenttype/forms"/>
   </ds:schemaRefs>
 </ds:datastoreItem>
 </file>
</xml_diff>